<commit_message>
Added intro slides and notes.
</commit_message>
<xml_diff>
--- a/history_of_vcs.pptx
+++ b/history_of_vcs.pptx
@@ -4,8 +4,17 @@
   <p:sldMasterIdLst>
     <p:sldMasterId id="2147483648" r:id="rId1"/>
   </p:sldMasterIdLst>
+  <p:notesMasterIdLst>
+    <p:notesMasterId r:id="rId9"/>
+  </p:notesMasterIdLst>
   <p:sldIdLst>
     <p:sldId id="256" r:id="rId2"/>
+    <p:sldId id="257" r:id="rId3"/>
+    <p:sldId id="258" r:id="rId4"/>
+    <p:sldId id="259" r:id="rId5"/>
+    <p:sldId id="260" r:id="rId6"/>
+    <p:sldId id="261" r:id="rId7"/>
+    <p:sldId id="262" r:id="rId8"/>
   </p:sldIdLst>
   <p:sldSz cx="12192000" cy="6858000"/>
   <p:notesSz cx="6858000" cy="9144000"/>
@@ -104,7 +113,1563 @@
       </a:defRPr>
     </a:lvl9pPr>
   </p:defaultTextStyle>
+  <p:extLst>
+    <p:ext uri="{521415D9-36F7-43E2-AB2F-B90AF26B5E84}">
+      <p14:sectionLst xmlns:p14="http://schemas.microsoft.com/office/powerpoint/2010/main">
+        <p14:section name="Introduction" id="{4DFA45C4-2D32-7346-954E-DC06BA3B3E27}">
+          <p14:sldIdLst>
+            <p14:sldId id="256"/>
+            <p14:sldId id="257"/>
+            <p14:sldId id="258"/>
+            <p14:sldId id="259"/>
+            <p14:sldId id="260"/>
+            <p14:sldId id="261"/>
+            <p14:sldId id="262"/>
+          </p14:sldIdLst>
+        </p14:section>
+        <p14:section name="Punch Cards" id="{7B0D4E70-912D-2A40-B7EE-FE410C0D397E}">
+          <p14:sldIdLst/>
+        </p14:section>
+        <p14:section name="1st Generation" id="{2EA1AFAB-058A-CB4A-BEAF-3426A1071678}">
+          <p14:sldIdLst/>
+        </p14:section>
+        <p14:section name="SCCS" id="{2AE7CF06-FF89-9F4D-B566-F0FF3EA3964F}">
+          <p14:sldIdLst/>
+        </p14:section>
+        <p14:section name="RCS" id="{09AB46B7-2303-0A4B-B058-0B335AADBF89}">
+          <p14:sldIdLst/>
+        </p14:section>
+        <p14:section name="2nd Generation" id="{45209AC7-80F2-EA4F-8C77-BCCDEF1898C9}">
+          <p14:sldIdLst/>
+        </p14:section>
+        <p14:section name="CVS" id="{7FD9FED3-F163-314E-B749-A1808776DC48}">
+          <p14:sldIdLst/>
+        </p14:section>
+        <p14:section name="SVN" id="{BC025DD9-1E8E-FD43-A221-74130B496E69}">
+          <p14:sldIdLst/>
+        </p14:section>
+        <p14:section name="3rd Generation" id="{3D80A012-6C49-E449-B0B1-547ABBEAED84}">
+          <p14:sldIdLst/>
+        </p14:section>
+        <p14:section name="BitKeeper" id="{25428B06-4066-2B46-B95E-69E39AFB888D}">
+          <p14:sldIdLst/>
+        </p14:section>
+        <p14:section name="Monotone" id="{1CDFD395-6915-6048-B992-3F58771214DE}">
+          <p14:sldIdLst/>
+        </p14:section>
+        <p14:section name="Darcs" id="{D79CF682-882D-6541-863A-C88934B08C8E}">
+          <p14:sldIdLst/>
+        </p14:section>
+        <p14:section name="Git" id="{2AEACCD0-27FF-BA48-B156-BA0F1C951CC6}">
+          <p14:sldIdLst/>
+        </p14:section>
+        <p14:section name="Mercurial" id="{A329D574-3C92-B54D-BE77-E5A40CA1CDF8}">
+          <p14:sldIdLst/>
+        </p14:section>
+        <p14:section name="Future" id="{A363C878-7C12-5A41-96AF-A075B2BE0081}">
+          <p14:sldIdLst/>
+        </p14:section>
+        <p14:section name="Conclusion" id="{E370FA80-8018-4D4D-9B83-04C91347F92D}">
+          <p14:sldIdLst/>
+        </p14:section>
+      </p14:sectionLst>
+    </p:ext>
+    <p:ext uri="{EFAFB233-063F-42B5-8137-9DF3F51BA10A}">
+      <p15:sldGuideLst xmlns:p15="http://schemas.microsoft.com/office/powerpoint/2012/main"/>
+    </p:ext>
+  </p:extLst>
 </p:presentation>
+</file>
+
+<file path=ppt/notesMasters/notesMaster1.xml><?xml version="1.0" encoding="utf-8"?>
+<p:notesMaster xmlns:a="http://schemas.openxmlformats.org/drawingml/2006/main" xmlns:r="http://schemas.openxmlformats.org/officeDocument/2006/relationships" xmlns:p="http://schemas.openxmlformats.org/presentationml/2006/main">
+  <p:cSld>
+    <p:bg>
+      <p:bgRef idx="1001">
+        <a:schemeClr val="bg1"/>
+      </p:bgRef>
+    </p:bg>
+    <p:spTree>
+      <p:nvGrpSpPr>
+        <p:cNvPr id="1" name=""/>
+        <p:cNvGrpSpPr/>
+        <p:nvPr/>
+      </p:nvGrpSpPr>
+      <p:grpSpPr>
+        <a:xfrm>
+          <a:off x="0" y="0"/>
+          <a:ext cx="0" cy="0"/>
+          <a:chOff x="0" y="0"/>
+          <a:chExt cx="0" cy="0"/>
+        </a:xfrm>
+      </p:grpSpPr>
+      <p:sp>
+        <p:nvSpPr>
+          <p:cNvPr id="2" name="Header Placeholder 1"/>
+          <p:cNvSpPr>
+            <a:spLocks noGrp="1"/>
+          </p:cNvSpPr>
+          <p:nvPr>
+            <p:ph type="hdr" sz="quarter"/>
+          </p:nvPr>
+        </p:nvSpPr>
+        <p:spPr>
+          <a:xfrm>
+            <a:off x="0" y="0"/>
+            <a:ext cx="2971800" cy="458788"/>
+          </a:xfrm>
+          <a:prstGeom prst="rect">
+            <a:avLst/>
+          </a:prstGeom>
+        </p:spPr>
+        <p:txBody>
+          <a:bodyPr vert="horz" lIns="91440" tIns="45720" rIns="91440" bIns="45720" rtlCol="0"/>
+          <a:lstStyle>
+            <a:lvl1pPr algn="l">
+              <a:defRPr sz="1200"/>
+            </a:lvl1pPr>
+          </a:lstStyle>
+          <a:p>
+            <a:endParaRPr lang="en-US"/>
+          </a:p>
+        </p:txBody>
+      </p:sp>
+      <p:sp>
+        <p:nvSpPr>
+          <p:cNvPr id="3" name="Date Placeholder 2"/>
+          <p:cNvSpPr>
+            <a:spLocks noGrp="1"/>
+          </p:cNvSpPr>
+          <p:nvPr>
+            <p:ph type="dt" idx="1"/>
+          </p:nvPr>
+        </p:nvSpPr>
+        <p:spPr>
+          <a:xfrm>
+            <a:off x="3884613" y="0"/>
+            <a:ext cx="2971800" cy="458788"/>
+          </a:xfrm>
+          <a:prstGeom prst="rect">
+            <a:avLst/>
+          </a:prstGeom>
+        </p:spPr>
+        <p:txBody>
+          <a:bodyPr vert="horz" lIns="91440" tIns="45720" rIns="91440" bIns="45720" rtlCol="0"/>
+          <a:lstStyle>
+            <a:lvl1pPr algn="r">
+              <a:defRPr sz="1200"/>
+            </a:lvl1pPr>
+          </a:lstStyle>
+          <a:p>
+            <a:fld id="{DEA2267F-5241-B647-B332-FAE0EE674554}" type="datetimeFigureOut">
+              <a:rPr lang="en-US" smtClean="0"/>
+              <a:t>12/26/19</a:t>
+            </a:fld>
+            <a:endParaRPr lang="en-US"/>
+          </a:p>
+        </p:txBody>
+      </p:sp>
+      <p:sp>
+        <p:nvSpPr>
+          <p:cNvPr id="4" name="Slide Image Placeholder 3"/>
+          <p:cNvSpPr>
+            <a:spLocks noGrp="1" noRot="1" noChangeAspect="1"/>
+          </p:cNvSpPr>
+          <p:nvPr>
+            <p:ph type="sldImg" idx="2"/>
+          </p:nvPr>
+        </p:nvSpPr>
+        <p:spPr>
+          <a:xfrm>
+            <a:off x="685800" y="1143000"/>
+            <a:ext cx="5486400" cy="3086100"/>
+          </a:xfrm>
+          <a:prstGeom prst="rect">
+            <a:avLst/>
+          </a:prstGeom>
+          <a:noFill/>
+          <a:ln w="12700">
+            <a:solidFill>
+              <a:prstClr val="black"/>
+            </a:solidFill>
+          </a:ln>
+        </p:spPr>
+        <p:txBody>
+          <a:bodyPr vert="horz" lIns="91440" tIns="45720" rIns="91440" bIns="45720" rtlCol="0" anchor="ctr"/>
+          <a:lstStyle/>
+          <a:p>
+            <a:endParaRPr lang="en-US"/>
+          </a:p>
+        </p:txBody>
+      </p:sp>
+      <p:sp>
+        <p:nvSpPr>
+          <p:cNvPr id="5" name="Notes Placeholder 4"/>
+          <p:cNvSpPr>
+            <a:spLocks noGrp="1"/>
+          </p:cNvSpPr>
+          <p:nvPr>
+            <p:ph type="body" sz="quarter" idx="3"/>
+          </p:nvPr>
+        </p:nvSpPr>
+        <p:spPr>
+          <a:xfrm>
+            <a:off x="685800" y="4400550"/>
+            <a:ext cx="5486400" cy="3600450"/>
+          </a:xfrm>
+          <a:prstGeom prst="rect">
+            <a:avLst/>
+          </a:prstGeom>
+        </p:spPr>
+        <p:txBody>
+          <a:bodyPr vert="horz" lIns="91440" tIns="45720" rIns="91440" bIns="45720" rtlCol="0"/>
+          <a:lstStyle/>
+          <a:p>
+            <a:pPr lvl="0"/>
+            <a:r>
+              <a:rPr lang="en-US"/>
+              <a:t>Click to edit Master text styles</a:t>
+            </a:r>
+          </a:p>
+          <a:p>
+            <a:pPr lvl="1"/>
+            <a:r>
+              <a:rPr lang="en-US"/>
+              <a:t>Second level</a:t>
+            </a:r>
+          </a:p>
+          <a:p>
+            <a:pPr lvl="2"/>
+            <a:r>
+              <a:rPr lang="en-US"/>
+              <a:t>Third level</a:t>
+            </a:r>
+          </a:p>
+          <a:p>
+            <a:pPr lvl="3"/>
+            <a:r>
+              <a:rPr lang="en-US"/>
+              <a:t>Fourth level</a:t>
+            </a:r>
+          </a:p>
+          <a:p>
+            <a:pPr lvl="4"/>
+            <a:r>
+              <a:rPr lang="en-US"/>
+              <a:t>Fifth level</a:t>
+            </a:r>
+          </a:p>
+        </p:txBody>
+      </p:sp>
+      <p:sp>
+        <p:nvSpPr>
+          <p:cNvPr id="6" name="Footer Placeholder 5"/>
+          <p:cNvSpPr>
+            <a:spLocks noGrp="1"/>
+          </p:cNvSpPr>
+          <p:nvPr>
+            <p:ph type="ftr" sz="quarter" idx="4"/>
+          </p:nvPr>
+        </p:nvSpPr>
+        <p:spPr>
+          <a:xfrm>
+            <a:off x="0" y="8685213"/>
+            <a:ext cx="2971800" cy="458787"/>
+          </a:xfrm>
+          <a:prstGeom prst="rect">
+            <a:avLst/>
+          </a:prstGeom>
+        </p:spPr>
+        <p:txBody>
+          <a:bodyPr vert="horz" lIns="91440" tIns="45720" rIns="91440" bIns="45720" rtlCol="0" anchor="b"/>
+          <a:lstStyle>
+            <a:lvl1pPr algn="l">
+              <a:defRPr sz="1200"/>
+            </a:lvl1pPr>
+          </a:lstStyle>
+          <a:p>
+            <a:endParaRPr lang="en-US"/>
+          </a:p>
+        </p:txBody>
+      </p:sp>
+      <p:sp>
+        <p:nvSpPr>
+          <p:cNvPr id="7" name="Slide Number Placeholder 6"/>
+          <p:cNvSpPr>
+            <a:spLocks noGrp="1"/>
+          </p:cNvSpPr>
+          <p:nvPr>
+            <p:ph type="sldNum" sz="quarter" idx="5"/>
+          </p:nvPr>
+        </p:nvSpPr>
+        <p:spPr>
+          <a:xfrm>
+            <a:off x="3884613" y="8685213"/>
+            <a:ext cx="2971800" cy="458787"/>
+          </a:xfrm>
+          <a:prstGeom prst="rect">
+            <a:avLst/>
+          </a:prstGeom>
+        </p:spPr>
+        <p:txBody>
+          <a:bodyPr vert="horz" lIns="91440" tIns="45720" rIns="91440" bIns="45720" rtlCol="0" anchor="b"/>
+          <a:lstStyle>
+            <a:lvl1pPr algn="r">
+              <a:defRPr sz="1200"/>
+            </a:lvl1pPr>
+          </a:lstStyle>
+          <a:p>
+            <a:fld id="{5E6354DD-F6CC-EB42-9131-304FDA262AAF}" type="slidenum">
+              <a:rPr lang="en-US" smtClean="0"/>
+              <a:t>‹#›</a:t>
+            </a:fld>
+            <a:endParaRPr lang="en-US"/>
+          </a:p>
+        </p:txBody>
+      </p:sp>
+    </p:spTree>
+    <p:extLst>
+      <p:ext uri="{BB962C8B-B14F-4D97-AF65-F5344CB8AC3E}">
+        <p14:creationId xmlns:p14="http://schemas.microsoft.com/office/powerpoint/2010/main" val="3497410763"/>
+      </p:ext>
+    </p:extLst>
+  </p:cSld>
+  <p:clrMap bg1="lt1" tx1="dk1" bg2="lt2" tx2="dk2" accent1="accent1" accent2="accent2" accent3="accent3" accent4="accent4" accent5="accent5" accent6="accent6" hlink="hlink" folHlink="folHlink"/>
+  <p:notesStyle>
+    <a:lvl1pPr marL="0" algn="l" defTabSz="914400" rtl="0" eaLnBrk="1" latinLnBrk="0" hangingPunct="1">
+      <a:defRPr sz="1200" kern="1200">
+        <a:solidFill>
+          <a:schemeClr val="tx1"/>
+        </a:solidFill>
+        <a:latin typeface="+mn-lt"/>
+        <a:ea typeface="+mn-ea"/>
+        <a:cs typeface="+mn-cs"/>
+      </a:defRPr>
+    </a:lvl1pPr>
+    <a:lvl2pPr marL="457200" algn="l" defTabSz="914400" rtl="0" eaLnBrk="1" latinLnBrk="0" hangingPunct="1">
+      <a:defRPr sz="1200" kern="1200">
+        <a:solidFill>
+          <a:schemeClr val="tx1"/>
+        </a:solidFill>
+        <a:latin typeface="+mn-lt"/>
+        <a:ea typeface="+mn-ea"/>
+        <a:cs typeface="+mn-cs"/>
+      </a:defRPr>
+    </a:lvl2pPr>
+    <a:lvl3pPr marL="914400" algn="l" defTabSz="914400" rtl="0" eaLnBrk="1" latinLnBrk="0" hangingPunct="1">
+      <a:defRPr sz="1200" kern="1200">
+        <a:solidFill>
+          <a:schemeClr val="tx1"/>
+        </a:solidFill>
+        <a:latin typeface="+mn-lt"/>
+        <a:ea typeface="+mn-ea"/>
+        <a:cs typeface="+mn-cs"/>
+      </a:defRPr>
+    </a:lvl3pPr>
+    <a:lvl4pPr marL="1371600" algn="l" defTabSz="914400" rtl="0" eaLnBrk="1" latinLnBrk="0" hangingPunct="1">
+      <a:defRPr sz="1200" kern="1200">
+        <a:solidFill>
+          <a:schemeClr val="tx1"/>
+        </a:solidFill>
+        <a:latin typeface="+mn-lt"/>
+        <a:ea typeface="+mn-ea"/>
+        <a:cs typeface="+mn-cs"/>
+      </a:defRPr>
+    </a:lvl4pPr>
+    <a:lvl5pPr marL="1828800" algn="l" defTabSz="914400" rtl="0" eaLnBrk="1" latinLnBrk="0" hangingPunct="1">
+      <a:defRPr sz="1200" kern="1200">
+        <a:solidFill>
+          <a:schemeClr val="tx1"/>
+        </a:solidFill>
+        <a:latin typeface="+mn-lt"/>
+        <a:ea typeface="+mn-ea"/>
+        <a:cs typeface="+mn-cs"/>
+      </a:defRPr>
+    </a:lvl5pPr>
+    <a:lvl6pPr marL="2286000" algn="l" defTabSz="914400" rtl="0" eaLnBrk="1" latinLnBrk="0" hangingPunct="1">
+      <a:defRPr sz="1200" kern="1200">
+        <a:solidFill>
+          <a:schemeClr val="tx1"/>
+        </a:solidFill>
+        <a:latin typeface="+mn-lt"/>
+        <a:ea typeface="+mn-ea"/>
+        <a:cs typeface="+mn-cs"/>
+      </a:defRPr>
+    </a:lvl6pPr>
+    <a:lvl7pPr marL="2743200" algn="l" defTabSz="914400" rtl="0" eaLnBrk="1" latinLnBrk="0" hangingPunct="1">
+      <a:defRPr sz="1200" kern="1200">
+        <a:solidFill>
+          <a:schemeClr val="tx1"/>
+        </a:solidFill>
+        <a:latin typeface="+mn-lt"/>
+        <a:ea typeface="+mn-ea"/>
+        <a:cs typeface="+mn-cs"/>
+      </a:defRPr>
+    </a:lvl7pPr>
+    <a:lvl8pPr marL="3200400" algn="l" defTabSz="914400" rtl="0" eaLnBrk="1" latinLnBrk="0" hangingPunct="1">
+      <a:defRPr sz="1200" kern="1200">
+        <a:solidFill>
+          <a:schemeClr val="tx1"/>
+        </a:solidFill>
+        <a:latin typeface="+mn-lt"/>
+        <a:ea typeface="+mn-ea"/>
+        <a:cs typeface="+mn-cs"/>
+      </a:defRPr>
+    </a:lvl8pPr>
+    <a:lvl9pPr marL="3657600" algn="l" defTabSz="914400" rtl="0" eaLnBrk="1" latinLnBrk="0" hangingPunct="1">
+      <a:defRPr sz="1200" kern="1200">
+        <a:solidFill>
+          <a:schemeClr val="tx1"/>
+        </a:solidFill>
+        <a:latin typeface="+mn-lt"/>
+        <a:ea typeface="+mn-ea"/>
+        <a:cs typeface="+mn-cs"/>
+      </a:defRPr>
+    </a:lvl9pPr>
+  </p:notesStyle>
+</p:notesMaster>
+</file>
+
+<file path=ppt/notesSlides/notesSlide1.xml><?xml version="1.0" encoding="utf-8"?>
+<p:notes xmlns:a="http://schemas.openxmlformats.org/drawingml/2006/main" xmlns:r="http://schemas.openxmlformats.org/officeDocument/2006/relationships" xmlns:p="http://schemas.openxmlformats.org/presentationml/2006/main">
+  <p:cSld>
+    <p:spTree>
+      <p:nvGrpSpPr>
+        <p:cNvPr id="1" name=""/>
+        <p:cNvGrpSpPr/>
+        <p:nvPr/>
+      </p:nvGrpSpPr>
+      <p:grpSpPr>
+        <a:xfrm>
+          <a:off x="0" y="0"/>
+          <a:ext cx="0" cy="0"/>
+          <a:chOff x="0" y="0"/>
+          <a:chExt cx="0" cy="0"/>
+        </a:xfrm>
+      </p:grpSpPr>
+      <p:sp>
+        <p:nvSpPr>
+          <p:cNvPr id="2" name="Slide Image Placeholder 1"/>
+          <p:cNvSpPr>
+            <a:spLocks noGrp="1" noRot="1" noChangeAspect="1"/>
+          </p:cNvSpPr>
+          <p:nvPr>
+            <p:ph type="sldImg"/>
+          </p:nvPr>
+        </p:nvSpPr>
+        <p:spPr/>
+      </p:sp>
+      <p:sp>
+        <p:nvSpPr>
+          <p:cNvPr id="3" name="Notes Placeholder 2"/>
+          <p:cNvSpPr>
+            <a:spLocks noGrp="1"/>
+          </p:cNvSpPr>
+          <p:nvPr>
+            <p:ph type="body" idx="1"/>
+          </p:nvPr>
+        </p:nvSpPr>
+        <p:spPr/>
+        <p:txBody>
+          <a:bodyPr/>
+          <a:lstStyle/>
+          <a:p>
+            <a:pPr marL="0" marR="0" lvl="0" indent="0" algn="l" defTabSz="914400" rtl="0" eaLnBrk="1" fontAlgn="auto" latinLnBrk="0" hangingPunct="1">
+              <a:lnSpc>
+                <a:spcPct val="100000"/>
+              </a:lnSpc>
+              <a:spcBef>
+                <a:spcPts val="0"/>
+              </a:spcBef>
+              <a:spcAft>
+                <a:spcPts val="0"/>
+              </a:spcAft>
+              <a:buClrTx/>
+              <a:buSzTx/>
+              <a:buFontTx/>
+              <a:buNone/>
+              <a:tabLst/>
+              <a:defRPr/>
+            </a:pPr>
+            <a:r>
+              <a:rPr lang="en-US" sz="1200" b="0" kern="1200" dirty="0">
+                <a:solidFill>
+                  <a:schemeClr val="tx1"/>
+                </a:solidFill>
+                <a:effectLst/>
+                <a:latin typeface="+mn-lt"/>
+                <a:ea typeface="+mn-ea"/>
+                <a:cs typeface="+mn-cs"/>
+              </a:rPr>
+              <a:t>Good morning/afternoon. How is everybody doing? Awake? Exhausted?</a:t>
+            </a:r>
+          </a:p>
+          <a:p>
+            <a:endParaRPr lang="en-US" dirty="0"/>
+          </a:p>
+        </p:txBody>
+      </p:sp>
+      <p:sp>
+        <p:nvSpPr>
+          <p:cNvPr id="4" name="Slide Number Placeholder 3"/>
+          <p:cNvSpPr>
+            <a:spLocks noGrp="1"/>
+          </p:cNvSpPr>
+          <p:nvPr>
+            <p:ph type="sldNum" sz="quarter" idx="5"/>
+          </p:nvPr>
+        </p:nvSpPr>
+        <p:spPr/>
+        <p:txBody>
+          <a:bodyPr/>
+          <a:lstStyle/>
+          <a:p>
+            <a:fld id="{5E6354DD-F6CC-EB42-9131-304FDA262AAF}" type="slidenum">
+              <a:rPr lang="en-US" smtClean="0"/>
+              <a:t>1</a:t>
+            </a:fld>
+            <a:endParaRPr lang="en-US"/>
+          </a:p>
+        </p:txBody>
+      </p:sp>
+    </p:spTree>
+    <p:extLst>
+      <p:ext uri="{BB962C8B-B14F-4D97-AF65-F5344CB8AC3E}">
+        <p14:creationId xmlns:p14="http://schemas.microsoft.com/office/powerpoint/2010/main" val="1024685160"/>
+      </p:ext>
+    </p:extLst>
+  </p:cSld>
+  <p:clrMapOvr>
+    <a:masterClrMapping/>
+  </p:clrMapOvr>
+</p:notes>
+</file>
+
+<file path=ppt/notesSlides/notesSlide2.xml><?xml version="1.0" encoding="utf-8"?>
+<p:notes xmlns:a="http://schemas.openxmlformats.org/drawingml/2006/main" xmlns:r="http://schemas.openxmlformats.org/officeDocument/2006/relationships" xmlns:p="http://schemas.openxmlformats.org/presentationml/2006/main">
+  <p:cSld>
+    <p:spTree>
+      <p:nvGrpSpPr>
+        <p:cNvPr id="1" name=""/>
+        <p:cNvGrpSpPr/>
+        <p:nvPr/>
+      </p:nvGrpSpPr>
+      <p:grpSpPr>
+        <a:xfrm>
+          <a:off x="0" y="0"/>
+          <a:ext cx="0" cy="0"/>
+          <a:chOff x="0" y="0"/>
+          <a:chExt cx="0" cy="0"/>
+        </a:xfrm>
+      </p:grpSpPr>
+      <p:sp>
+        <p:nvSpPr>
+          <p:cNvPr id="2" name="Slide Image Placeholder 1"/>
+          <p:cNvSpPr>
+            <a:spLocks noGrp="1" noRot="1" noChangeAspect="1"/>
+          </p:cNvSpPr>
+          <p:nvPr>
+            <p:ph type="sldImg"/>
+          </p:nvPr>
+        </p:nvSpPr>
+        <p:spPr/>
+      </p:sp>
+      <p:sp>
+        <p:nvSpPr>
+          <p:cNvPr id="3" name="Notes Placeholder 2"/>
+          <p:cNvSpPr>
+            <a:spLocks noGrp="1"/>
+          </p:cNvSpPr>
+          <p:nvPr>
+            <p:ph type="body" idx="1"/>
+          </p:nvPr>
+        </p:nvSpPr>
+        <p:spPr/>
+        <p:txBody>
+          <a:bodyPr/>
+          <a:lstStyle/>
+          <a:p>
+            <a:pPr marL="0" marR="0" lvl="0" indent="0" algn="l" defTabSz="914400" rtl="0" eaLnBrk="1" fontAlgn="auto" latinLnBrk="0" hangingPunct="1">
+              <a:lnSpc>
+                <a:spcPct val="100000"/>
+              </a:lnSpc>
+              <a:spcBef>
+                <a:spcPts val="0"/>
+              </a:spcBef>
+              <a:spcAft>
+                <a:spcPts val="0"/>
+              </a:spcAft>
+              <a:buClrTx/>
+              <a:buSzTx/>
+              <a:buFontTx/>
+              <a:buNone/>
+              <a:tabLst/>
+              <a:defRPr/>
+            </a:pPr>
+            <a:r>
+              <a:rPr lang="en-US" sz="1200" b="0" kern="1200" dirty="0">
+                <a:solidFill>
+                  <a:schemeClr val="tx1"/>
+                </a:solidFill>
+                <a:effectLst/>
+                <a:latin typeface="+mn-lt"/>
+                <a:ea typeface="+mn-ea"/>
+                <a:cs typeface="+mn-cs"/>
+              </a:rPr>
+              <a:t>My name is Brian Meeker. I'm a software developer for </a:t>
+            </a:r>
+            <a:r>
+              <a:rPr lang="en-US" sz="1200" b="0" kern="1200" dirty="0" err="1">
+                <a:solidFill>
+                  <a:schemeClr val="tx1"/>
+                </a:solidFill>
+                <a:effectLst/>
+                <a:latin typeface="+mn-lt"/>
+                <a:ea typeface="+mn-ea"/>
+                <a:cs typeface="+mn-cs"/>
+              </a:rPr>
+              <a:t>InfernoRed</a:t>
+            </a:r>
+            <a:r>
+              <a:rPr lang="en-US" sz="1200" b="0" kern="1200" dirty="0">
+                <a:solidFill>
+                  <a:schemeClr val="tx1"/>
+                </a:solidFill>
+                <a:effectLst/>
+                <a:latin typeface="+mn-lt"/>
+                <a:ea typeface="+mn-ea"/>
+                <a:cs typeface="+mn-cs"/>
+              </a:rPr>
+              <a:t> Technology. I work as a consultant, mostly in .NET and JS/Typescript, but also a bunch of other things. My official title is Engineering Wizard, but I'm a jack of all trades, master of none kind of guy.</a:t>
+            </a:r>
+            <a:endParaRPr lang="en-US" dirty="0"/>
+          </a:p>
+        </p:txBody>
+      </p:sp>
+      <p:sp>
+        <p:nvSpPr>
+          <p:cNvPr id="4" name="Slide Number Placeholder 3"/>
+          <p:cNvSpPr>
+            <a:spLocks noGrp="1"/>
+          </p:cNvSpPr>
+          <p:nvPr>
+            <p:ph type="sldNum" sz="quarter" idx="5"/>
+          </p:nvPr>
+        </p:nvSpPr>
+        <p:spPr/>
+        <p:txBody>
+          <a:bodyPr/>
+          <a:lstStyle/>
+          <a:p>
+            <a:fld id="{5E6354DD-F6CC-EB42-9131-304FDA262AAF}" type="slidenum">
+              <a:rPr lang="en-US" smtClean="0"/>
+              <a:t>2</a:t>
+            </a:fld>
+            <a:endParaRPr lang="en-US"/>
+          </a:p>
+        </p:txBody>
+      </p:sp>
+    </p:spTree>
+    <p:extLst>
+      <p:ext uri="{BB962C8B-B14F-4D97-AF65-F5344CB8AC3E}">
+        <p14:creationId xmlns:p14="http://schemas.microsoft.com/office/powerpoint/2010/main" val="1090095988"/>
+      </p:ext>
+    </p:extLst>
+  </p:cSld>
+  <p:clrMapOvr>
+    <a:masterClrMapping/>
+  </p:clrMapOvr>
+</p:notes>
+</file>
+
+<file path=ppt/notesSlides/notesSlide3.xml><?xml version="1.0" encoding="utf-8"?>
+<p:notes xmlns:a="http://schemas.openxmlformats.org/drawingml/2006/main" xmlns:r="http://schemas.openxmlformats.org/officeDocument/2006/relationships" xmlns:p="http://schemas.openxmlformats.org/presentationml/2006/main">
+  <p:cSld>
+    <p:spTree>
+      <p:nvGrpSpPr>
+        <p:cNvPr id="1" name=""/>
+        <p:cNvGrpSpPr/>
+        <p:nvPr/>
+      </p:nvGrpSpPr>
+      <p:grpSpPr>
+        <a:xfrm>
+          <a:off x="0" y="0"/>
+          <a:ext cx="0" cy="0"/>
+          <a:chOff x="0" y="0"/>
+          <a:chExt cx="0" cy="0"/>
+        </a:xfrm>
+      </p:grpSpPr>
+      <p:sp>
+        <p:nvSpPr>
+          <p:cNvPr id="2" name="Slide Image Placeholder 1"/>
+          <p:cNvSpPr>
+            <a:spLocks noGrp="1" noRot="1" noChangeAspect="1"/>
+          </p:cNvSpPr>
+          <p:nvPr>
+            <p:ph type="sldImg"/>
+          </p:nvPr>
+        </p:nvSpPr>
+        <p:spPr/>
+      </p:sp>
+      <p:sp>
+        <p:nvSpPr>
+          <p:cNvPr id="3" name="Notes Placeholder 2"/>
+          <p:cNvSpPr>
+            <a:spLocks noGrp="1"/>
+          </p:cNvSpPr>
+          <p:nvPr>
+            <p:ph type="body" idx="1"/>
+          </p:nvPr>
+        </p:nvSpPr>
+        <p:spPr/>
+        <p:txBody>
+          <a:bodyPr/>
+          <a:lstStyle/>
+          <a:p>
+            <a:pPr marL="0" marR="0" lvl="0" indent="0" algn="l" defTabSz="914400" rtl="0" eaLnBrk="1" fontAlgn="auto" latinLnBrk="0" hangingPunct="1">
+              <a:lnSpc>
+                <a:spcPct val="100000"/>
+              </a:lnSpc>
+              <a:spcBef>
+                <a:spcPts val="0"/>
+              </a:spcBef>
+              <a:spcAft>
+                <a:spcPts val="0"/>
+              </a:spcAft>
+              <a:buClrTx/>
+              <a:buSzTx/>
+              <a:buFontTx/>
+              <a:buNone/>
+              <a:tabLst/>
+              <a:defRPr/>
+            </a:pPr>
+            <a:r>
+              <a:rPr lang="en-US" sz="1200" b="0" kern="1200" dirty="0">
+                <a:solidFill>
+                  <a:schemeClr val="tx1"/>
+                </a:solidFill>
+                <a:effectLst/>
+                <a:latin typeface="+mn-lt"/>
+                <a:ea typeface="+mn-ea"/>
+                <a:cs typeface="+mn-cs"/>
+              </a:rPr>
+              <a:t>Stop by the </a:t>
+            </a:r>
+            <a:r>
+              <a:rPr lang="en-US" sz="1200" b="0" kern="1200" dirty="0" err="1">
+                <a:solidFill>
+                  <a:schemeClr val="tx1"/>
+                </a:solidFill>
+                <a:effectLst/>
+                <a:latin typeface="+mn-lt"/>
+                <a:ea typeface="+mn-ea"/>
+                <a:cs typeface="+mn-cs"/>
+              </a:rPr>
+              <a:t>InfernoRed</a:t>
+            </a:r>
+            <a:r>
+              <a:rPr lang="en-US" sz="1200" b="0" kern="1200" dirty="0">
+                <a:solidFill>
+                  <a:schemeClr val="tx1"/>
+                </a:solidFill>
+                <a:effectLst/>
+                <a:latin typeface="+mn-lt"/>
+                <a:ea typeface="+mn-ea"/>
+                <a:cs typeface="+mn-cs"/>
+              </a:rPr>
+              <a:t> booth if you want to chat about this talk or any other cool stuff you've seen at CodeMash this week.</a:t>
+            </a:r>
+          </a:p>
+          <a:p>
+            <a:endParaRPr lang="en-US" dirty="0"/>
+          </a:p>
+        </p:txBody>
+      </p:sp>
+      <p:sp>
+        <p:nvSpPr>
+          <p:cNvPr id="4" name="Slide Number Placeholder 3"/>
+          <p:cNvSpPr>
+            <a:spLocks noGrp="1"/>
+          </p:cNvSpPr>
+          <p:nvPr>
+            <p:ph type="sldNum" sz="quarter" idx="5"/>
+          </p:nvPr>
+        </p:nvSpPr>
+        <p:spPr/>
+        <p:txBody>
+          <a:bodyPr/>
+          <a:lstStyle/>
+          <a:p>
+            <a:fld id="{5E6354DD-F6CC-EB42-9131-304FDA262AAF}" type="slidenum">
+              <a:rPr lang="en-US" smtClean="0"/>
+              <a:t>3</a:t>
+            </a:fld>
+            <a:endParaRPr lang="en-US"/>
+          </a:p>
+        </p:txBody>
+      </p:sp>
+    </p:spTree>
+    <p:extLst>
+      <p:ext uri="{BB962C8B-B14F-4D97-AF65-F5344CB8AC3E}">
+        <p14:creationId xmlns:p14="http://schemas.microsoft.com/office/powerpoint/2010/main" val="1822415516"/>
+      </p:ext>
+    </p:extLst>
+  </p:cSld>
+  <p:clrMapOvr>
+    <a:masterClrMapping/>
+  </p:clrMapOvr>
+</p:notes>
+</file>
+
+<file path=ppt/notesSlides/notesSlide4.xml><?xml version="1.0" encoding="utf-8"?>
+<p:notes xmlns:a="http://schemas.openxmlformats.org/drawingml/2006/main" xmlns:r="http://schemas.openxmlformats.org/officeDocument/2006/relationships" xmlns:p="http://schemas.openxmlformats.org/presentationml/2006/main">
+  <p:cSld>
+    <p:spTree>
+      <p:nvGrpSpPr>
+        <p:cNvPr id="1" name=""/>
+        <p:cNvGrpSpPr/>
+        <p:nvPr/>
+      </p:nvGrpSpPr>
+      <p:grpSpPr>
+        <a:xfrm>
+          <a:off x="0" y="0"/>
+          <a:ext cx="0" cy="0"/>
+          <a:chOff x="0" y="0"/>
+          <a:chExt cx="0" cy="0"/>
+        </a:xfrm>
+      </p:grpSpPr>
+      <p:sp>
+        <p:nvSpPr>
+          <p:cNvPr id="2" name="Slide Image Placeholder 1"/>
+          <p:cNvSpPr>
+            <a:spLocks noGrp="1" noRot="1" noChangeAspect="1"/>
+          </p:cNvSpPr>
+          <p:nvPr>
+            <p:ph type="sldImg"/>
+          </p:nvPr>
+        </p:nvSpPr>
+        <p:spPr/>
+      </p:sp>
+      <p:sp>
+        <p:nvSpPr>
+          <p:cNvPr id="3" name="Notes Placeholder 2"/>
+          <p:cNvSpPr>
+            <a:spLocks noGrp="1"/>
+          </p:cNvSpPr>
+          <p:nvPr>
+            <p:ph type="body" idx="1"/>
+          </p:nvPr>
+        </p:nvSpPr>
+        <p:spPr/>
+        <p:txBody>
+          <a:bodyPr/>
+          <a:lstStyle/>
+          <a:p>
+            <a:pPr marL="0" marR="0" lvl="0" indent="0" algn="l" defTabSz="914400" rtl="0" eaLnBrk="1" fontAlgn="auto" latinLnBrk="0" hangingPunct="1">
+              <a:lnSpc>
+                <a:spcPct val="100000"/>
+              </a:lnSpc>
+              <a:spcBef>
+                <a:spcPts val="0"/>
+              </a:spcBef>
+              <a:spcAft>
+                <a:spcPts val="0"/>
+              </a:spcAft>
+              <a:buClrTx/>
+              <a:buSzTx/>
+              <a:buFontTx/>
+              <a:buNone/>
+              <a:tabLst/>
+              <a:defRPr/>
+            </a:pPr>
+            <a:r>
+              <a:rPr lang="en-US" sz="1200" b="0" kern="1200" dirty="0">
+                <a:solidFill>
+                  <a:schemeClr val="tx1"/>
+                </a:solidFill>
+                <a:effectLst/>
+                <a:latin typeface="+mn-lt"/>
+                <a:ea typeface="+mn-ea"/>
+                <a:cs typeface="+mn-cs"/>
+              </a:rPr>
+              <a:t>So, you're here for a history talk. What makes me qualified to give a history talk? This is me putting my imaginary history minor to use. You see, I took all the courses to get a history minor, but never actually talked to anybody in the history department about it, so... no minor for me. But I put in all the work, and I think that's the important part. I'm pretty sure that avoiding the paperwork and the human interaction required to complete a task is the most stereotypical software developer behavior you can imagine.</a:t>
+            </a:r>
+          </a:p>
+          <a:p>
+            <a:endParaRPr lang="en-US" dirty="0"/>
+          </a:p>
+          <a:p>
+            <a:r>
+              <a:rPr lang="en-US" dirty="0"/>
+              <a:t>And for the curious, from left to right those are a </a:t>
+            </a:r>
+          </a:p>
+          <a:p>
+            <a:endParaRPr lang="en-US" dirty="0"/>
+          </a:p>
+          <a:p>
+            <a:r>
+              <a:rPr lang="en-US" dirty="0"/>
+              <a:t>IBM 1402 Card Read Punch, Model 1 - $24,800</a:t>
+            </a:r>
+          </a:p>
+          <a:p>
+            <a:r>
+              <a:rPr lang="en-US" dirty="0"/>
+              <a:t>IBM 1401 Processing Unit, Model A-1 - $70,500</a:t>
+            </a:r>
+          </a:p>
+          <a:p>
+            <a:r>
+              <a:rPr lang="en-US" dirty="0"/>
+              <a:t>IBM 1403 Printer, Model 1 - $30,300</a:t>
+            </a:r>
+          </a:p>
+          <a:p>
+            <a:r>
+              <a:rPr lang="en-US" dirty="0"/>
+              <a:t>Total Price $125,600</a:t>
+            </a:r>
+          </a:p>
+          <a:p>
+            <a:endParaRPr lang="en-US" dirty="0"/>
+          </a:p>
+          <a:p>
+            <a:r>
+              <a:rPr lang="en-US" dirty="0"/>
+              <a:t>Apparently, the Computer History Museum has two working 1401’s.</a:t>
+            </a:r>
+          </a:p>
+          <a:p>
+            <a:endParaRPr lang="en-US" dirty="0"/>
+          </a:p>
+          <a:p>
+            <a:pPr marL="0" marR="0" lvl="0" indent="0" algn="l" defTabSz="914400" rtl="0" eaLnBrk="1" fontAlgn="auto" latinLnBrk="0" hangingPunct="1">
+              <a:lnSpc>
+                <a:spcPct val="100000"/>
+              </a:lnSpc>
+              <a:spcBef>
+                <a:spcPts val="0"/>
+              </a:spcBef>
+              <a:spcAft>
+                <a:spcPts val="0"/>
+              </a:spcAft>
+              <a:buClrTx/>
+              <a:buSzTx/>
+              <a:buFontTx/>
+              <a:buNone/>
+              <a:tabLst/>
+              <a:defRPr/>
+            </a:pPr>
+            <a:r>
+              <a:rPr lang="en-US" sz="1200" b="0" kern="1200" dirty="0">
+                <a:solidFill>
+                  <a:schemeClr val="tx1"/>
+                </a:solidFill>
+                <a:effectLst/>
+                <a:latin typeface="+mn-lt"/>
+                <a:ea typeface="+mn-ea"/>
+                <a:cs typeface="+mn-cs"/>
+              </a:rPr>
+              <a:t>I also want to thank Jenny Manning for doing her talk at last year's CodeMash - </a:t>
+            </a:r>
+            <a:r>
+              <a:rPr lang="en-US" sz="1200" b="0" i="1" kern="1200" dirty="0">
+                <a:solidFill>
+                  <a:schemeClr val="tx1"/>
+                </a:solidFill>
+                <a:effectLst/>
+                <a:latin typeface="+mn-lt"/>
+                <a:ea typeface="+mn-ea"/>
+                <a:cs typeface="+mn-cs"/>
+              </a:rPr>
+              <a:t>Mommy, where do new programming languages come from?</a:t>
+            </a:r>
+            <a:r>
+              <a:rPr lang="en-US" sz="1200" b="0" kern="1200" dirty="0">
+                <a:solidFill>
+                  <a:schemeClr val="tx1"/>
+                </a:solidFill>
+                <a:effectLst/>
+                <a:latin typeface="+mn-lt"/>
+                <a:ea typeface="+mn-ea"/>
+                <a:cs typeface="+mn-cs"/>
+              </a:rPr>
+              <a:t> last year. Her talk was the inspiration for me submitting this talk and speaking here this year.</a:t>
+            </a:r>
+          </a:p>
+          <a:p>
+            <a:endParaRPr lang="en-US" dirty="0"/>
+          </a:p>
+        </p:txBody>
+      </p:sp>
+      <p:sp>
+        <p:nvSpPr>
+          <p:cNvPr id="4" name="Slide Number Placeholder 3"/>
+          <p:cNvSpPr>
+            <a:spLocks noGrp="1"/>
+          </p:cNvSpPr>
+          <p:nvPr>
+            <p:ph type="sldNum" sz="quarter" idx="5"/>
+          </p:nvPr>
+        </p:nvSpPr>
+        <p:spPr/>
+        <p:txBody>
+          <a:bodyPr/>
+          <a:lstStyle/>
+          <a:p>
+            <a:fld id="{5E6354DD-F6CC-EB42-9131-304FDA262AAF}" type="slidenum">
+              <a:rPr lang="en-US" smtClean="0"/>
+              <a:t>4</a:t>
+            </a:fld>
+            <a:endParaRPr lang="en-US"/>
+          </a:p>
+        </p:txBody>
+      </p:sp>
+    </p:spTree>
+    <p:extLst>
+      <p:ext uri="{BB962C8B-B14F-4D97-AF65-F5344CB8AC3E}">
+        <p14:creationId xmlns:p14="http://schemas.microsoft.com/office/powerpoint/2010/main" val="625692064"/>
+      </p:ext>
+    </p:extLst>
+  </p:cSld>
+  <p:clrMapOvr>
+    <a:masterClrMapping/>
+  </p:clrMapOvr>
+</p:notes>
+</file>
+
+<file path=ppt/notesSlides/notesSlide5.xml><?xml version="1.0" encoding="utf-8"?>
+<p:notes xmlns:a="http://schemas.openxmlformats.org/drawingml/2006/main" xmlns:r="http://schemas.openxmlformats.org/officeDocument/2006/relationships" xmlns:p="http://schemas.openxmlformats.org/presentationml/2006/main">
+  <p:cSld>
+    <p:spTree>
+      <p:nvGrpSpPr>
+        <p:cNvPr id="1" name=""/>
+        <p:cNvGrpSpPr/>
+        <p:nvPr/>
+      </p:nvGrpSpPr>
+      <p:grpSpPr>
+        <a:xfrm>
+          <a:off x="0" y="0"/>
+          <a:ext cx="0" cy="0"/>
+          <a:chOff x="0" y="0"/>
+          <a:chExt cx="0" cy="0"/>
+        </a:xfrm>
+      </p:grpSpPr>
+      <p:sp>
+        <p:nvSpPr>
+          <p:cNvPr id="2" name="Slide Image Placeholder 1"/>
+          <p:cNvSpPr>
+            <a:spLocks noGrp="1" noRot="1" noChangeAspect="1"/>
+          </p:cNvSpPr>
+          <p:nvPr>
+            <p:ph type="sldImg"/>
+          </p:nvPr>
+        </p:nvSpPr>
+        <p:spPr/>
+      </p:sp>
+      <p:sp>
+        <p:nvSpPr>
+          <p:cNvPr id="3" name="Notes Placeholder 2"/>
+          <p:cNvSpPr>
+            <a:spLocks noGrp="1"/>
+          </p:cNvSpPr>
+          <p:nvPr>
+            <p:ph type="body" idx="1"/>
+          </p:nvPr>
+        </p:nvSpPr>
+        <p:spPr/>
+        <p:txBody>
+          <a:bodyPr/>
+          <a:lstStyle/>
+          <a:p>
+            <a:r>
+              <a:rPr lang="en-US" dirty="0"/>
+              <a:t>I am not above stooping to Wikipedia for definitions. This one is pretty straightforward and probably matches your intuition about what version control is. </a:t>
+            </a:r>
+          </a:p>
+        </p:txBody>
+      </p:sp>
+      <p:sp>
+        <p:nvSpPr>
+          <p:cNvPr id="4" name="Slide Number Placeholder 3"/>
+          <p:cNvSpPr>
+            <a:spLocks noGrp="1"/>
+          </p:cNvSpPr>
+          <p:nvPr>
+            <p:ph type="sldNum" sz="quarter" idx="5"/>
+          </p:nvPr>
+        </p:nvSpPr>
+        <p:spPr/>
+        <p:txBody>
+          <a:bodyPr/>
+          <a:lstStyle/>
+          <a:p>
+            <a:fld id="{5E6354DD-F6CC-EB42-9131-304FDA262AAF}" type="slidenum">
+              <a:rPr lang="en-US" smtClean="0"/>
+              <a:t>5</a:t>
+            </a:fld>
+            <a:endParaRPr lang="en-US"/>
+          </a:p>
+        </p:txBody>
+      </p:sp>
+    </p:spTree>
+    <p:extLst>
+      <p:ext uri="{BB962C8B-B14F-4D97-AF65-F5344CB8AC3E}">
+        <p14:creationId xmlns:p14="http://schemas.microsoft.com/office/powerpoint/2010/main" val="1018192919"/>
+      </p:ext>
+    </p:extLst>
+  </p:cSld>
+  <p:clrMapOvr>
+    <a:masterClrMapping/>
+  </p:clrMapOvr>
+</p:notes>
+</file>
+
+<file path=ppt/notesSlides/notesSlide6.xml><?xml version="1.0" encoding="utf-8"?>
+<p:notes xmlns:a="http://schemas.openxmlformats.org/drawingml/2006/main" xmlns:r="http://schemas.openxmlformats.org/officeDocument/2006/relationships" xmlns:p="http://schemas.openxmlformats.org/presentationml/2006/main">
+  <p:cSld>
+    <p:spTree>
+      <p:nvGrpSpPr>
+        <p:cNvPr id="1" name=""/>
+        <p:cNvGrpSpPr/>
+        <p:nvPr/>
+      </p:nvGrpSpPr>
+      <p:grpSpPr>
+        <a:xfrm>
+          <a:off x="0" y="0"/>
+          <a:ext cx="0" cy="0"/>
+          <a:chOff x="0" y="0"/>
+          <a:chExt cx="0" cy="0"/>
+        </a:xfrm>
+      </p:grpSpPr>
+      <p:sp>
+        <p:nvSpPr>
+          <p:cNvPr id="2" name="Slide Image Placeholder 1"/>
+          <p:cNvSpPr>
+            <a:spLocks noGrp="1" noRot="1" noChangeAspect="1"/>
+          </p:cNvSpPr>
+          <p:nvPr>
+            <p:ph type="sldImg"/>
+          </p:nvPr>
+        </p:nvSpPr>
+        <p:spPr/>
+      </p:sp>
+      <p:sp>
+        <p:nvSpPr>
+          <p:cNvPr id="3" name="Notes Placeholder 2"/>
+          <p:cNvSpPr>
+            <a:spLocks noGrp="1"/>
+          </p:cNvSpPr>
+          <p:nvPr>
+            <p:ph type="body" idx="1"/>
+          </p:nvPr>
+        </p:nvSpPr>
+        <p:spPr/>
+        <p:txBody>
+          <a:bodyPr/>
+          <a:lstStyle/>
+          <a:p>
+            <a:r>
+              <a:rPr lang="en-US" dirty="0"/>
+              <a:t>I’m also not above pulling definitions from the official Git book as part of their documentation. I like that this version specifically calls out recalling specific versions later.</a:t>
+            </a:r>
+          </a:p>
+          <a:p>
+            <a:endParaRPr lang="en-US" dirty="0"/>
+          </a:p>
+          <a:p>
+            <a:pPr marL="0" marR="0" lvl="0" indent="0" algn="l" defTabSz="914400" rtl="0" eaLnBrk="1" fontAlgn="auto" latinLnBrk="0" hangingPunct="1">
+              <a:lnSpc>
+                <a:spcPct val="100000"/>
+              </a:lnSpc>
+              <a:spcBef>
+                <a:spcPts val="0"/>
+              </a:spcBef>
+              <a:spcAft>
+                <a:spcPts val="0"/>
+              </a:spcAft>
+              <a:buClrTx/>
+              <a:buSzTx/>
+              <a:buFontTx/>
+              <a:buNone/>
+              <a:tabLst/>
+              <a:defRPr/>
+            </a:pPr>
+            <a:r>
+              <a:rPr lang="en-US" sz="1200" b="0" kern="1200" dirty="0">
+                <a:solidFill>
+                  <a:schemeClr val="tx1"/>
+                </a:solidFill>
+                <a:effectLst/>
+                <a:latin typeface="+mn-lt"/>
+                <a:ea typeface="+mn-ea"/>
+                <a:cs typeface="+mn-cs"/>
+              </a:rPr>
+              <a:t>You'll notice these definitions don't lay out any specific requirements about what features a version control system needs to have. We would certainly like it to be easy to visualize changes. We would certainly like to have atomic commits. We would certainly like it to be easy to manage releases. But none of these are required. You just need to record changes so you can get back to a specific version if needed. That's it.</a:t>
+            </a:r>
+          </a:p>
+          <a:p>
+            <a:endParaRPr lang="en-US" dirty="0"/>
+          </a:p>
+          <a:p>
+            <a:r>
+              <a:rPr lang="en-US" dirty="0"/>
+              <a:t>There are also a couple of different terms for version control.</a:t>
+            </a:r>
+          </a:p>
+          <a:p>
+            <a:r>
+              <a:rPr lang="en-US" dirty="0"/>
+              <a:t>VCS = Version Control Software</a:t>
+            </a:r>
+          </a:p>
+          <a:p>
+            <a:r>
+              <a:rPr lang="en-US" dirty="0"/>
+              <a:t>SCM = Source Control Management/Software Configuration </a:t>
+            </a:r>
+            <a:r>
+              <a:rPr lang="en-US" dirty="0" err="1"/>
+              <a:t>ManagementRevision</a:t>
+            </a:r>
+            <a:r>
+              <a:rPr lang="en-US" dirty="0"/>
+              <a:t> Control</a:t>
+            </a:r>
+          </a:p>
+          <a:p>
+            <a:r>
+              <a:rPr lang="en-US" dirty="0"/>
+              <a:t>Revision Control</a:t>
+            </a:r>
+          </a:p>
+          <a:p>
+            <a:endParaRPr lang="en-US" dirty="0"/>
+          </a:p>
+          <a:p>
+            <a:pPr marL="0" marR="0" lvl="0" indent="0" algn="l" defTabSz="914400" rtl="0" eaLnBrk="1" fontAlgn="auto" latinLnBrk="0" hangingPunct="1">
+              <a:lnSpc>
+                <a:spcPct val="100000"/>
+              </a:lnSpc>
+              <a:spcBef>
+                <a:spcPts val="0"/>
+              </a:spcBef>
+              <a:spcAft>
+                <a:spcPts val="0"/>
+              </a:spcAft>
+              <a:buClrTx/>
+              <a:buSzTx/>
+              <a:buFontTx/>
+              <a:buNone/>
+              <a:tabLst/>
+              <a:defRPr/>
+            </a:pPr>
+            <a:r>
+              <a:rPr lang="en-US" dirty="0"/>
+              <a:t>Sometimes you’ll here VCS. Sometimes SCM. Occasionally revision control. I’m going to try and be consistent here and use the term “version control”, but I could slip up.</a:t>
+            </a:r>
+          </a:p>
+          <a:p>
+            <a:endParaRPr lang="en-US" dirty="0"/>
+          </a:p>
+          <a:p>
+            <a:pPr marL="0" marR="0" lvl="0" indent="0" algn="l" defTabSz="914400" rtl="0" eaLnBrk="1" fontAlgn="auto" latinLnBrk="0" hangingPunct="1">
+              <a:lnSpc>
+                <a:spcPct val="100000"/>
+              </a:lnSpc>
+              <a:spcBef>
+                <a:spcPts val="0"/>
+              </a:spcBef>
+              <a:spcAft>
+                <a:spcPts val="0"/>
+              </a:spcAft>
+              <a:buClrTx/>
+              <a:buSzTx/>
+              <a:buFontTx/>
+              <a:buNone/>
+              <a:tabLst/>
+              <a:defRPr/>
+            </a:pPr>
+            <a:r>
+              <a:rPr lang="en-US" sz="1200" b="0" kern="1200" dirty="0">
+                <a:solidFill>
+                  <a:schemeClr val="tx1"/>
+                </a:solidFill>
+                <a:effectLst/>
+                <a:latin typeface="+mn-lt"/>
+                <a:ea typeface="+mn-ea"/>
+                <a:cs typeface="+mn-cs"/>
+              </a:rPr>
+              <a:t>Any distinction between these terms is generally meaningless. Software Configuration Management can have a slightly different meaning depending on context, but that isn't important in the context of this talk.</a:t>
+            </a:r>
+          </a:p>
+          <a:p>
+            <a:endParaRPr lang="en-US" dirty="0"/>
+          </a:p>
+          <a:p>
+            <a:endParaRPr lang="en-US" dirty="0"/>
+          </a:p>
+        </p:txBody>
+      </p:sp>
+      <p:sp>
+        <p:nvSpPr>
+          <p:cNvPr id="4" name="Slide Number Placeholder 3"/>
+          <p:cNvSpPr>
+            <a:spLocks noGrp="1"/>
+          </p:cNvSpPr>
+          <p:nvPr>
+            <p:ph type="sldNum" sz="quarter" idx="5"/>
+          </p:nvPr>
+        </p:nvSpPr>
+        <p:spPr/>
+        <p:txBody>
+          <a:bodyPr/>
+          <a:lstStyle/>
+          <a:p>
+            <a:fld id="{5E6354DD-F6CC-EB42-9131-304FDA262AAF}" type="slidenum">
+              <a:rPr lang="en-US" smtClean="0"/>
+              <a:t>6</a:t>
+            </a:fld>
+            <a:endParaRPr lang="en-US"/>
+          </a:p>
+        </p:txBody>
+      </p:sp>
+    </p:spTree>
+    <p:extLst>
+      <p:ext uri="{BB962C8B-B14F-4D97-AF65-F5344CB8AC3E}">
+        <p14:creationId xmlns:p14="http://schemas.microsoft.com/office/powerpoint/2010/main" val="2144905707"/>
+      </p:ext>
+    </p:extLst>
+  </p:cSld>
+  <p:clrMapOvr>
+    <a:masterClrMapping/>
+  </p:clrMapOvr>
+</p:notes>
+</file>
+
+<file path=ppt/notesSlides/notesSlide7.xml><?xml version="1.0" encoding="utf-8"?>
+<p:notes xmlns:a="http://schemas.openxmlformats.org/drawingml/2006/main" xmlns:r="http://schemas.openxmlformats.org/officeDocument/2006/relationships" xmlns:p="http://schemas.openxmlformats.org/presentationml/2006/main">
+  <p:cSld>
+    <p:spTree>
+      <p:nvGrpSpPr>
+        <p:cNvPr id="1" name=""/>
+        <p:cNvGrpSpPr/>
+        <p:nvPr/>
+      </p:nvGrpSpPr>
+      <p:grpSpPr>
+        <a:xfrm>
+          <a:off x="0" y="0"/>
+          <a:ext cx="0" cy="0"/>
+          <a:chOff x="0" y="0"/>
+          <a:chExt cx="0" cy="0"/>
+        </a:xfrm>
+      </p:grpSpPr>
+      <p:sp>
+        <p:nvSpPr>
+          <p:cNvPr id="2" name="Slide Image Placeholder 1"/>
+          <p:cNvSpPr>
+            <a:spLocks noGrp="1" noRot="1" noChangeAspect="1"/>
+          </p:cNvSpPr>
+          <p:nvPr>
+            <p:ph type="sldImg"/>
+          </p:nvPr>
+        </p:nvSpPr>
+        <p:spPr/>
+      </p:sp>
+      <p:sp>
+        <p:nvSpPr>
+          <p:cNvPr id="3" name="Notes Placeholder 2"/>
+          <p:cNvSpPr>
+            <a:spLocks noGrp="1"/>
+          </p:cNvSpPr>
+          <p:nvPr>
+            <p:ph type="body" idx="1"/>
+          </p:nvPr>
+        </p:nvSpPr>
+        <p:spPr/>
+        <p:txBody>
+          <a:bodyPr/>
+          <a:lstStyle/>
+          <a:p>
+            <a:r>
+              <a:rPr lang="en-US" sz="1200" b="0" kern="1200" dirty="0">
+                <a:solidFill>
+                  <a:schemeClr val="tx1"/>
+                </a:solidFill>
+                <a:effectLst/>
+                <a:latin typeface="+mn-lt"/>
+                <a:ea typeface="+mn-ea"/>
+                <a:cs typeface="+mn-cs"/>
+              </a:rPr>
+              <a:t>We only have so much time, so these items are mostly out of scope.</a:t>
+            </a:r>
+          </a:p>
+          <a:p>
+            <a:endParaRPr lang="en-US" sz="1200" b="0" kern="1200" dirty="0">
+              <a:solidFill>
+                <a:schemeClr val="tx1"/>
+              </a:solidFill>
+              <a:effectLst/>
+              <a:latin typeface="+mn-lt"/>
+              <a:ea typeface="+mn-ea"/>
+              <a:cs typeface="+mn-cs"/>
+            </a:endParaRPr>
+          </a:p>
+          <a:p>
+            <a:r>
+              <a:rPr lang="en-US" sz="1200" b="0" kern="1200" dirty="0">
+                <a:solidFill>
+                  <a:schemeClr val="tx1"/>
+                </a:solidFill>
+                <a:effectLst/>
+                <a:latin typeface="+mn-lt"/>
+                <a:ea typeface="+mn-ea"/>
+                <a:cs typeface="+mn-cs"/>
+              </a:rPr>
+              <a:t>* Repository hosting services like </a:t>
+            </a:r>
+            <a:r>
+              <a:rPr lang="en-US" sz="1200" b="0" kern="1200" dirty="0" err="1">
+                <a:solidFill>
+                  <a:schemeClr val="tx1"/>
+                </a:solidFill>
+                <a:effectLst/>
+                <a:latin typeface="+mn-lt"/>
+                <a:ea typeface="+mn-ea"/>
+                <a:cs typeface="+mn-cs"/>
+              </a:rPr>
+              <a:t>Sourceforge</a:t>
+            </a:r>
+            <a:r>
+              <a:rPr lang="en-US" sz="1200" b="0" kern="1200" dirty="0">
+                <a:solidFill>
+                  <a:schemeClr val="tx1"/>
+                </a:solidFill>
+                <a:effectLst/>
+                <a:latin typeface="+mn-lt"/>
+                <a:ea typeface="+mn-ea"/>
+                <a:cs typeface="+mn-cs"/>
+              </a:rPr>
+              <a:t>, GitHub, and </a:t>
+            </a:r>
+            <a:r>
+              <a:rPr lang="en-US" sz="1200" b="0" kern="1200" dirty="0" err="1">
+                <a:solidFill>
+                  <a:schemeClr val="tx1"/>
+                </a:solidFill>
+                <a:effectLst/>
+                <a:latin typeface="+mn-lt"/>
+                <a:ea typeface="+mn-ea"/>
+                <a:cs typeface="+mn-cs"/>
+              </a:rPr>
+              <a:t>BitBucket</a:t>
+            </a:r>
+            <a:r>
+              <a:rPr lang="en-US" sz="1200" b="0" kern="1200" dirty="0">
+                <a:solidFill>
+                  <a:schemeClr val="tx1"/>
+                </a:solidFill>
+                <a:effectLst/>
+                <a:latin typeface="+mn-lt"/>
+                <a:ea typeface="+mn-ea"/>
+                <a:cs typeface="+mn-cs"/>
+              </a:rPr>
+              <a:t>.</a:t>
+            </a:r>
+          </a:p>
+          <a:p>
+            <a:r>
+              <a:rPr lang="en-US" sz="1200" b="0" kern="1200" dirty="0">
+                <a:solidFill>
+                  <a:schemeClr val="tx1"/>
+                </a:solidFill>
+                <a:effectLst/>
+                <a:latin typeface="+mn-lt"/>
+                <a:ea typeface="+mn-ea"/>
+                <a:cs typeface="+mn-cs"/>
+              </a:rPr>
+              <a:t>* Integrated version control, like you see in modern word processors, spreadsheets, or content management systems.</a:t>
+            </a:r>
+          </a:p>
+          <a:p>
+            <a:r>
+              <a:rPr lang="en-US" sz="1200" b="0" kern="1200" dirty="0">
+                <a:solidFill>
+                  <a:schemeClr val="tx1"/>
+                </a:solidFill>
+                <a:effectLst/>
+                <a:latin typeface="+mn-lt"/>
+                <a:ea typeface="+mn-ea"/>
+                <a:cs typeface="+mn-cs"/>
+              </a:rPr>
+              <a:t>* Wikis</a:t>
+            </a:r>
+          </a:p>
+          <a:p>
+            <a:br>
+              <a:rPr lang="en-US" sz="1200" b="0" kern="1200" dirty="0">
+                <a:solidFill>
+                  <a:schemeClr val="tx1"/>
+                </a:solidFill>
+                <a:effectLst/>
+                <a:latin typeface="+mn-lt"/>
+                <a:ea typeface="+mn-ea"/>
+                <a:cs typeface="+mn-cs"/>
+              </a:rPr>
+            </a:br>
+            <a:r>
+              <a:rPr lang="en-US" sz="1200" b="0" kern="1200" dirty="0">
+                <a:solidFill>
+                  <a:schemeClr val="tx1"/>
+                </a:solidFill>
+                <a:effectLst/>
+                <a:latin typeface="+mn-lt"/>
+                <a:ea typeface="+mn-ea"/>
+                <a:cs typeface="+mn-cs"/>
+              </a:rPr>
+              <a:t>These things are all important in the history of version control, but they are out of scope for this talk. We're going to focus on the tools that have been primarily used by development teams.</a:t>
+            </a:r>
+          </a:p>
+          <a:p>
+            <a:endParaRPr lang="en-US" dirty="0"/>
+          </a:p>
+        </p:txBody>
+      </p:sp>
+      <p:sp>
+        <p:nvSpPr>
+          <p:cNvPr id="4" name="Slide Number Placeholder 3"/>
+          <p:cNvSpPr>
+            <a:spLocks noGrp="1"/>
+          </p:cNvSpPr>
+          <p:nvPr>
+            <p:ph type="sldNum" sz="quarter" idx="5"/>
+          </p:nvPr>
+        </p:nvSpPr>
+        <p:spPr/>
+        <p:txBody>
+          <a:bodyPr/>
+          <a:lstStyle/>
+          <a:p>
+            <a:fld id="{5E6354DD-F6CC-EB42-9131-304FDA262AAF}" type="slidenum">
+              <a:rPr lang="en-US" smtClean="0"/>
+              <a:t>7</a:t>
+            </a:fld>
+            <a:endParaRPr lang="en-US"/>
+          </a:p>
+        </p:txBody>
+      </p:sp>
+    </p:spTree>
+    <p:extLst>
+      <p:ext uri="{BB962C8B-B14F-4D97-AF65-F5344CB8AC3E}">
+        <p14:creationId xmlns:p14="http://schemas.microsoft.com/office/powerpoint/2010/main" val="2456835831"/>
+      </p:ext>
+    </p:extLst>
+  </p:cSld>
+  <p:clrMapOvr>
+    <a:masterClrMapping/>
+  </p:clrMapOvr>
+</p:notes>
 </file>
 
 <file path=ppt/slideLayouts/slideLayout1.xml><?xml version="1.0" encoding="utf-8"?>
@@ -3339,10 +4904,15 @@
         </p:nvSpPr>
         <p:spPr/>
         <p:txBody>
-          <a:bodyPr/>
-          <a:lstStyle/>
-          <a:p>
-            <a:endParaRPr lang="en-US"/>
+          <a:bodyPr>
+            <a:normAutofit/>
+          </a:bodyPr>
+          <a:lstStyle/>
+          <a:p>
+            <a:r>
+              <a:rPr lang="en-US" dirty="0"/>
+              <a:t>From Punch Cards to Git</a:t>
+            </a:r>
           </a:p>
         </p:txBody>
       </p:sp>
@@ -3364,10 +4934,30 @@
         </p:nvSpPr>
         <p:spPr/>
         <p:txBody>
-          <a:bodyPr/>
-          <a:lstStyle/>
-          <a:p>
-            <a:endParaRPr lang="en-US"/>
+          <a:bodyPr>
+            <a:normAutofit/>
+          </a:bodyPr>
+          <a:lstStyle/>
+          <a:p>
+            <a:r>
+              <a:rPr lang="en-US" dirty="0"/>
+              <a:t>A Brief History of Version Control</a:t>
+            </a:r>
+          </a:p>
+          <a:p>
+            <a:endParaRPr lang="en-US" dirty="0"/>
+          </a:p>
+          <a:p>
+            <a:r>
+              <a:rPr lang="en-US" dirty="0">
+                <a:hlinkClick r:id="rId3"/>
+              </a:rPr>
+              <a:t>https://github.com/CuriousCurmudgeon/history_of_vcs</a:t>
+            </a:r>
+            <a:endParaRPr lang="en-US" dirty="0"/>
+          </a:p>
+          <a:p>
+            <a:endParaRPr lang="en-US" dirty="0"/>
           </a:p>
         </p:txBody>
       </p:sp>
@@ -3375,6 +4965,693 @@
     <p:extLst>
       <p:ext uri="{BB962C8B-B14F-4D97-AF65-F5344CB8AC3E}">
         <p14:creationId xmlns:p14="http://schemas.microsoft.com/office/powerpoint/2010/main" val="2958009826"/>
+      </p:ext>
+    </p:extLst>
+  </p:cSld>
+  <p:clrMapOvr>
+    <a:masterClrMapping/>
+  </p:clrMapOvr>
+</p:sld>
+</file>
+
+<file path=ppt/slides/slide2.xml><?xml version="1.0" encoding="utf-8"?>
+<p:sld xmlns:a="http://schemas.openxmlformats.org/drawingml/2006/main" xmlns:r="http://schemas.openxmlformats.org/officeDocument/2006/relationships" xmlns:p="http://schemas.openxmlformats.org/presentationml/2006/main">
+  <p:cSld>
+    <p:bg>
+      <p:bgPr>
+        <a:solidFill>
+          <a:schemeClr val="bg1"/>
+        </a:solidFill>
+        <a:effectLst/>
+      </p:bgPr>
+    </p:bg>
+    <p:spTree>
+      <p:nvGrpSpPr>
+        <p:cNvPr id="1" name=""/>
+        <p:cNvGrpSpPr/>
+        <p:nvPr/>
+      </p:nvGrpSpPr>
+      <p:grpSpPr>
+        <a:xfrm>
+          <a:off x="0" y="0"/>
+          <a:ext cx="0" cy="0"/>
+          <a:chOff x="0" y="0"/>
+          <a:chExt cx="0" cy="0"/>
+        </a:xfrm>
+      </p:grpSpPr>
+      <p:pic>
+        <p:nvPicPr>
+          <p:cNvPr id="8" name="Content Placeholder 7" descr="Brian Meeker">
+            <a:extLst>
+              <a:ext uri="{FF2B5EF4-FFF2-40B4-BE49-F238E27FC236}">
+                <a16:creationId xmlns:a16="http://schemas.microsoft.com/office/drawing/2014/main" id="{5C6FA8BD-8F42-7541-BB5A-F0332D6FAC2F}"/>
+              </a:ext>
+            </a:extLst>
+          </p:cNvPr>
+          <p:cNvPicPr>
+            <a:picLocks noGrp="1" noChangeAspect="1"/>
+          </p:cNvPicPr>
+          <p:nvPr>
+            <p:ph sz="half" idx="1"/>
+          </p:nvPr>
+        </p:nvPicPr>
+        <p:blipFill rotWithShape="1">
+          <a:blip r:embed="rId3"/>
+          <a:srcRect l="18453" r="13953"/>
+          <a:stretch/>
+        </p:blipFill>
+        <p:spPr>
+          <a:xfrm>
+            <a:off x="20" y="10"/>
+            <a:ext cx="4635571" cy="6857990"/>
+          </a:xfrm>
+          <a:prstGeom prst="rect">
+            <a:avLst/>
+          </a:prstGeom>
+          <a:effectLst/>
+        </p:spPr>
+      </p:pic>
+      <p:sp>
+        <p:nvSpPr>
+          <p:cNvPr id="6" name="Content Placeholder 5">
+            <a:extLst>
+              <a:ext uri="{FF2B5EF4-FFF2-40B4-BE49-F238E27FC236}">
+                <a16:creationId xmlns:a16="http://schemas.microsoft.com/office/drawing/2014/main" id="{C8E88F39-D5D6-8A4D-ACA9-DC3B2B4D968E}"/>
+              </a:ext>
+            </a:extLst>
+          </p:cNvPr>
+          <p:cNvSpPr>
+            <a:spLocks noGrp="1"/>
+          </p:cNvSpPr>
+          <p:nvPr>
+            <p:ph sz="half" idx="2"/>
+          </p:nvPr>
+        </p:nvSpPr>
+        <p:spPr>
+          <a:xfrm>
+            <a:off x="6916349" y="0"/>
+            <a:ext cx="4635571" cy="6858000"/>
+          </a:xfrm>
+        </p:spPr>
+        <p:txBody>
+          <a:bodyPr vert="horz" lIns="91440" tIns="45720" rIns="91440" bIns="45720" rtlCol="0" anchor="ctr">
+            <a:normAutofit/>
+          </a:bodyPr>
+          <a:lstStyle/>
+          <a:p>
+            <a:pPr marL="0" indent="0">
+              <a:buNone/>
+            </a:pPr>
+            <a:r>
+              <a:rPr lang="en-US" sz="2400" dirty="0"/>
+              <a:t>Brian Meeker</a:t>
+            </a:r>
+          </a:p>
+          <a:p>
+            <a:pPr marL="0" indent="0">
+              <a:buNone/>
+            </a:pPr>
+            <a:r>
+              <a:rPr lang="en-US" sz="2400" dirty="0"/>
+              <a:t>@</a:t>
+            </a:r>
+            <a:r>
+              <a:rPr lang="en-US" sz="2400" dirty="0" err="1"/>
+              <a:t>CuriousCurmudge</a:t>
+            </a:r>
+            <a:endParaRPr lang="en-US" sz="2400" dirty="0"/>
+          </a:p>
+        </p:txBody>
+      </p:sp>
+    </p:spTree>
+    <p:extLst>
+      <p:ext uri="{BB962C8B-B14F-4D97-AF65-F5344CB8AC3E}">
+        <p14:creationId xmlns:p14="http://schemas.microsoft.com/office/powerpoint/2010/main" val="1999889717"/>
+      </p:ext>
+    </p:extLst>
+  </p:cSld>
+  <p:clrMapOvr>
+    <a:masterClrMapping/>
+  </p:clrMapOvr>
+</p:sld>
+</file>
+
+<file path=ppt/slides/slide3.xml><?xml version="1.0" encoding="utf-8"?>
+<p:sld xmlns:a="http://schemas.openxmlformats.org/drawingml/2006/main" xmlns:r="http://schemas.openxmlformats.org/officeDocument/2006/relationships" xmlns:p="http://schemas.openxmlformats.org/presentationml/2006/main">
+  <p:cSld>
+    <p:spTree>
+      <p:nvGrpSpPr>
+        <p:cNvPr id="1" name=""/>
+        <p:cNvGrpSpPr/>
+        <p:nvPr/>
+      </p:nvGrpSpPr>
+      <p:grpSpPr>
+        <a:xfrm>
+          <a:off x="0" y="0"/>
+          <a:ext cx="0" cy="0"/>
+          <a:chOff x="0" y="0"/>
+          <a:chExt cx="0" cy="0"/>
+        </a:xfrm>
+      </p:grpSpPr>
+      <p:pic>
+        <p:nvPicPr>
+          <p:cNvPr id="16" name="Content Placeholder 15" descr="A picture containing food, drawing&#10;&#10;Description automatically generated">
+            <a:extLst>
+              <a:ext uri="{FF2B5EF4-FFF2-40B4-BE49-F238E27FC236}">
+                <a16:creationId xmlns:a16="http://schemas.microsoft.com/office/drawing/2014/main" id="{A34DB2B2-1A1F-2541-A5B0-DF45F01656AB}"/>
+              </a:ext>
+            </a:extLst>
+          </p:cNvPr>
+          <p:cNvPicPr>
+            <a:picLocks noGrp="1" noChangeAspect="1"/>
+          </p:cNvPicPr>
+          <p:nvPr>
+            <p:ph sz="half" idx="1"/>
+          </p:nvPr>
+        </p:nvPicPr>
+        <p:blipFill>
+          <a:blip r:embed="rId3"/>
+          <a:stretch>
+            <a:fillRect/>
+          </a:stretch>
+        </p:blipFill>
+        <p:spPr>
+          <a:xfrm>
+            <a:off x="838200" y="1256854"/>
+            <a:ext cx="5181600" cy="4344292"/>
+          </a:xfrm>
+        </p:spPr>
+      </p:pic>
+      <p:sp>
+        <p:nvSpPr>
+          <p:cNvPr id="4" name="Content Placeholder 3">
+            <a:extLst>
+              <a:ext uri="{FF2B5EF4-FFF2-40B4-BE49-F238E27FC236}">
+                <a16:creationId xmlns:a16="http://schemas.microsoft.com/office/drawing/2014/main" id="{21637E6D-77F3-FB43-AC60-2D52CD49C3C8}"/>
+              </a:ext>
+            </a:extLst>
+          </p:cNvPr>
+          <p:cNvSpPr>
+            <a:spLocks noGrp="1"/>
+          </p:cNvSpPr>
+          <p:nvPr>
+            <p:ph sz="half" idx="2"/>
+          </p:nvPr>
+        </p:nvSpPr>
+        <p:spPr>
+          <a:xfrm>
+            <a:off x="6172200" y="1256855"/>
+            <a:ext cx="5181600" cy="4344292"/>
+          </a:xfrm>
+        </p:spPr>
+        <p:txBody>
+          <a:bodyPr anchor="ctr"/>
+          <a:lstStyle/>
+          <a:p>
+            <a:pPr marL="0" indent="0">
+              <a:buNone/>
+            </a:pPr>
+            <a:r>
+              <a:rPr lang="en-US" dirty="0"/>
+              <a:t>Look for the dragon right outside of Salon A.</a:t>
+            </a:r>
+          </a:p>
+        </p:txBody>
+      </p:sp>
+    </p:spTree>
+    <p:extLst>
+      <p:ext uri="{BB962C8B-B14F-4D97-AF65-F5344CB8AC3E}">
+        <p14:creationId xmlns:p14="http://schemas.microsoft.com/office/powerpoint/2010/main" val="3639347317"/>
+      </p:ext>
+    </p:extLst>
+  </p:cSld>
+  <p:clrMapOvr>
+    <a:masterClrMapping/>
+  </p:clrMapOvr>
+</p:sld>
+</file>
+
+<file path=ppt/slides/slide4.xml><?xml version="1.0" encoding="utf-8"?>
+<p:sld xmlns:a="http://schemas.openxmlformats.org/drawingml/2006/main" xmlns:r="http://schemas.openxmlformats.org/officeDocument/2006/relationships" xmlns:p="http://schemas.openxmlformats.org/presentationml/2006/main">
+  <p:cSld>
+    <p:spTree>
+      <p:nvGrpSpPr>
+        <p:cNvPr id="1" name=""/>
+        <p:cNvGrpSpPr/>
+        <p:nvPr/>
+      </p:nvGrpSpPr>
+      <p:grpSpPr>
+        <a:xfrm>
+          <a:off x="0" y="0"/>
+          <a:ext cx="0" cy="0"/>
+          <a:chOff x="0" y="0"/>
+          <a:chExt cx="0" cy="0"/>
+        </a:xfrm>
+      </p:grpSpPr>
+      <p:pic>
+        <p:nvPicPr>
+          <p:cNvPr id="8" name="Picture 7" descr="A black and white photo of a living room&#10;&#10;Description automatically generated">
+            <a:extLst>
+              <a:ext uri="{FF2B5EF4-FFF2-40B4-BE49-F238E27FC236}">
+                <a16:creationId xmlns:a16="http://schemas.microsoft.com/office/drawing/2014/main" id="{6FE37328-FD35-5E4E-968F-308375ED499B}"/>
+              </a:ext>
+            </a:extLst>
+          </p:cNvPr>
+          <p:cNvPicPr>
+            <a:picLocks noChangeAspect="1"/>
+          </p:cNvPicPr>
+          <p:nvPr/>
+        </p:nvPicPr>
+        <p:blipFill>
+          <a:blip r:embed="rId3"/>
+          <a:stretch>
+            <a:fillRect/>
+          </a:stretch>
+        </p:blipFill>
+        <p:spPr>
+          <a:xfrm>
+            <a:off x="2722879" y="1043589"/>
+            <a:ext cx="6746240" cy="4770822"/>
+          </a:xfrm>
+          <a:prstGeom prst="rect">
+            <a:avLst/>
+          </a:prstGeom>
+        </p:spPr>
+      </p:pic>
+      <p:sp>
+        <p:nvSpPr>
+          <p:cNvPr id="9" name="TextBox 8">
+            <a:extLst>
+              <a:ext uri="{FF2B5EF4-FFF2-40B4-BE49-F238E27FC236}">
+                <a16:creationId xmlns:a16="http://schemas.microsoft.com/office/drawing/2014/main" id="{86416390-4E6D-C744-8D8C-8EF1D90A1B97}"/>
+              </a:ext>
+            </a:extLst>
+          </p:cNvPr>
+          <p:cNvSpPr txBox="1"/>
+          <p:nvPr/>
+        </p:nvSpPr>
+        <p:spPr>
+          <a:xfrm>
+            <a:off x="2162326" y="6103620"/>
+            <a:ext cx="7867347" cy="369332"/>
+          </a:xfrm>
+          <a:prstGeom prst="rect">
+            <a:avLst/>
+          </a:prstGeom>
+          <a:noFill/>
+        </p:spPr>
+        <p:txBody>
+          <a:bodyPr wrap="none" rtlCol="0">
+            <a:spAutoFit/>
+          </a:bodyPr>
+          <a:lstStyle/>
+          <a:p>
+            <a:r>
+              <a:rPr lang="en-US" dirty="0">
+                <a:hlinkClick r:id="rId4"/>
+              </a:rPr>
+              <a:t>https://en.wikipedia.org/wiki/IBM_1400_series#/media/File:BRL61-IBM_1401.jpg</a:t>
+            </a:r>
+            <a:endParaRPr lang="en-US" dirty="0"/>
+          </a:p>
+        </p:txBody>
+      </p:sp>
+    </p:spTree>
+    <p:extLst>
+      <p:ext uri="{BB962C8B-B14F-4D97-AF65-F5344CB8AC3E}">
+        <p14:creationId xmlns:p14="http://schemas.microsoft.com/office/powerpoint/2010/main" val="2840283375"/>
+      </p:ext>
+    </p:extLst>
+  </p:cSld>
+  <p:clrMapOvr>
+    <a:masterClrMapping/>
+  </p:clrMapOvr>
+</p:sld>
+</file>
+
+<file path=ppt/slides/slide5.xml><?xml version="1.0" encoding="utf-8"?>
+<p:sld xmlns:a="http://schemas.openxmlformats.org/drawingml/2006/main" xmlns:r="http://schemas.openxmlformats.org/officeDocument/2006/relationships" xmlns:p="http://schemas.openxmlformats.org/presentationml/2006/main">
+  <p:cSld>
+    <p:spTree>
+      <p:nvGrpSpPr>
+        <p:cNvPr id="1" name=""/>
+        <p:cNvGrpSpPr/>
+        <p:nvPr/>
+      </p:nvGrpSpPr>
+      <p:grpSpPr>
+        <a:xfrm>
+          <a:off x="0" y="0"/>
+          <a:ext cx="0" cy="0"/>
+          <a:chOff x="0" y="0"/>
+          <a:chExt cx="0" cy="0"/>
+        </a:xfrm>
+      </p:grpSpPr>
+      <p:sp>
+        <p:nvSpPr>
+          <p:cNvPr id="2" name="Title 1">
+            <a:extLst>
+              <a:ext uri="{FF2B5EF4-FFF2-40B4-BE49-F238E27FC236}">
+                <a16:creationId xmlns:a16="http://schemas.microsoft.com/office/drawing/2014/main" id="{FC182244-8E8D-9A44-8B05-2B54DE5E2026}"/>
+              </a:ext>
+            </a:extLst>
+          </p:cNvPr>
+          <p:cNvSpPr>
+            <a:spLocks noGrp="1"/>
+          </p:cNvSpPr>
+          <p:nvPr>
+            <p:ph type="title"/>
+          </p:nvPr>
+        </p:nvSpPr>
+        <p:spPr/>
+        <p:txBody>
+          <a:bodyPr/>
+          <a:lstStyle/>
+          <a:p>
+            <a:r>
+              <a:rPr lang="en-US" dirty="0"/>
+              <a:t>What is version control?</a:t>
+            </a:r>
+          </a:p>
+        </p:txBody>
+      </p:sp>
+      <p:sp>
+        <p:nvSpPr>
+          <p:cNvPr id="4" name="Rounded Rectangle 3">
+            <a:extLst>
+              <a:ext uri="{FF2B5EF4-FFF2-40B4-BE49-F238E27FC236}">
+                <a16:creationId xmlns:a16="http://schemas.microsoft.com/office/drawing/2014/main" id="{ACF48BC0-AF8F-5246-957F-D4EA32996746}"/>
+              </a:ext>
+            </a:extLst>
+          </p:cNvPr>
+          <p:cNvSpPr/>
+          <p:nvPr/>
+        </p:nvSpPr>
+        <p:spPr>
+          <a:xfrm>
+            <a:off x="2354580" y="2125980"/>
+            <a:ext cx="7280910" cy="2743200"/>
+          </a:xfrm>
+          <a:prstGeom prst="roundRect">
+            <a:avLst/>
+          </a:prstGeom>
+        </p:spPr>
+        <p:style>
+          <a:lnRef idx="2">
+            <a:schemeClr val="accent1">
+              <a:shade val="50000"/>
+            </a:schemeClr>
+          </a:lnRef>
+          <a:fillRef idx="1">
+            <a:schemeClr val="accent1"/>
+          </a:fillRef>
+          <a:effectRef idx="0">
+            <a:schemeClr val="accent1"/>
+          </a:effectRef>
+          <a:fontRef idx="minor">
+            <a:schemeClr val="lt1"/>
+          </a:fontRef>
+        </p:style>
+        <p:txBody>
+          <a:bodyPr rtlCol="0" anchor="ctr"/>
+          <a:lstStyle/>
+          <a:p>
+            <a:pPr algn="ctr"/>
+            <a:r>
+              <a:rPr lang="en-US" i="1" dirty="0"/>
+              <a:t>…the management of changes to documents, computer programs, large web sites, and other collections of information.</a:t>
+            </a:r>
+          </a:p>
+          <a:p>
+            <a:pPr algn="ctr"/>
+            <a:endParaRPr lang="en-US" dirty="0"/>
+          </a:p>
+          <a:p>
+            <a:r>
+              <a:rPr lang="en-US" dirty="0"/>
+              <a:t>- https://</a:t>
+            </a:r>
+            <a:r>
+              <a:rPr lang="en-US" dirty="0" err="1"/>
+              <a:t>en.wikipedia.org</a:t>
+            </a:r>
+            <a:r>
+              <a:rPr lang="en-US" dirty="0"/>
+              <a:t>/wiki/</a:t>
+            </a:r>
+            <a:r>
+              <a:rPr lang="en-US" dirty="0" err="1"/>
+              <a:t>Version_control</a:t>
+            </a:r>
+            <a:endParaRPr lang="en-US" dirty="0"/>
+          </a:p>
+          <a:p>
+            <a:endParaRPr lang="en-US" dirty="0"/>
+          </a:p>
+        </p:txBody>
+      </p:sp>
+    </p:spTree>
+    <p:extLst>
+      <p:ext uri="{BB962C8B-B14F-4D97-AF65-F5344CB8AC3E}">
+        <p14:creationId xmlns:p14="http://schemas.microsoft.com/office/powerpoint/2010/main" val="2331355478"/>
+      </p:ext>
+    </p:extLst>
+  </p:cSld>
+  <p:clrMapOvr>
+    <a:masterClrMapping/>
+  </p:clrMapOvr>
+</p:sld>
+</file>
+
+<file path=ppt/slides/slide6.xml><?xml version="1.0" encoding="utf-8"?>
+<p:sld xmlns:a="http://schemas.openxmlformats.org/drawingml/2006/main" xmlns:r="http://schemas.openxmlformats.org/officeDocument/2006/relationships" xmlns:p="http://schemas.openxmlformats.org/presentationml/2006/main">
+  <p:cSld>
+    <p:spTree>
+      <p:nvGrpSpPr>
+        <p:cNvPr id="1" name=""/>
+        <p:cNvGrpSpPr/>
+        <p:nvPr/>
+      </p:nvGrpSpPr>
+      <p:grpSpPr>
+        <a:xfrm>
+          <a:off x="0" y="0"/>
+          <a:ext cx="0" cy="0"/>
+          <a:chOff x="0" y="0"/>
+          <a:chExt cx="0" cy="0"/>
+        </a:xfrm>
+      </p:grpSpPr>
+      <p:sp>
+        <p:nvSpPr>
+          <p:cNvPr id="2" name="Title 1">
+            <a:extLst>
+              <a:ext uri="{FF2B5EF4-FFF2-40B4-BE49-F238E27FC236}">
+                <a16:creationId xmlns:a16="http://schemas.microsoft.com/office/drawing/2014/main" id="{FC182244-8E8D-9A44-8B05-2B54DE5E2026}"/>
+              </a:ext>
+            </a:extLst>
+          </p:cNvPr>
+          <p:cNvSpPr>
+            <a:spLocks noGrp="1"/>
+          </p:cNvSpPr>
+          <p:nvPr>
+            <p:ph type="title"/>
+          </p:nvPr>
+        </p:nvSpPr>
+        <p:spPr/>
+        <p:txBody>
+          <a:bodyPr/>
+          <a:lstStyle/>
+          <a:p>
+            <a:r>
+              <a:rPr lang="en-US" dirty="0"/>
+              <a:t>What is version control?</a:t>
+            </a:r>
+          </a:p>
+        </p:txBody>
+      </p:sp>
+      <p:sp>
+        <p:nvSpPr>
+          <p:cNvPr id="4" name="Rounded Rectangle 3">
+            <a:extLst>
+              <a:ext uri="{FF2B5EF4-FFF2-40B4-BE49-F238E27FC236}">
+                <a16:creationId xmlns:a16="http://schemas.microsoft.com/office/drawing/2014/main" id="{ACF48BC0-AF8F-5246-957F-D4EA32996746}"/>
+              </a:ext>
+            </a:extLst>
+          </p:cNvPr>
+          <p:cNvSpPr/>
+          <p:nvPr/>
+        </p:nvSpPr>
+        <p:spPr>
+          <a:xfrm>
+            <a:off x="2354580" y="2125980"/>
+            <a:ext cx="7280910" cy="2743200"/>
+          </a:xfrm>
+          <a:prstGeom prst="roundRect">
+            <a:avLst/>
+          </a:prstGeom>
+        </p:spPr>
+        <p:style>
+          <a:lnRef idx="2">
+            <a:schemeClr val="accent1">
+              <a:shade val="50000"/>
+            </a:schemeClr>
+          </a:lnRef>
+          <a:fillRef idx="1">
+            <a:schemeClr val="accent1"/>
+          </a:fillRef>
+          <a:effectRef idx="0">
+            <a:schemeClr val="accent1"/>
+          </a:effectRef>
+          <a:fontRef idx="minor">
+            <a:schemeClr val="lt1"/>
+          </a:fontRef>
+        </p:style>
+        <p:txBody>
+          <a:bodyPr rtlCol="0" anchor="ctr"/>
+          <a:lstStyle/>
+          <a:p>
+            <a:pPr algn="ctr"/>
+            <a:r>
+              <a:rPr lang="en-US" dirty="0"/>
+              <a:t>…a system that records changes to a file or set of files over time so that you can recall specific versions later.</a:t>
+            </a:r>
+          </a:p>
+          <a:p>
+            <a:pPr algn="ctr"/>
+            <a:endParaRPr lang="en-US" dirty="0"/>
+          </a:p>
+          <a:p>
+            <a:r>
+              <a:rPr lang="en-US" dirty="0"/>
+              <a:t>- https://git-</a:t>
+            </a:r>
+            <a:r>
+              <a:rPr lang="en-US" dirty="0" err="1"/>
+              <a:t>scm.com</a:t>
+            </a:r>
+            <a:r>
+              <a:rPr lang="en-US" dirty="0"/>
+              <a:t>/book/</a:t>
+            </a:r>
+            <a:r>
+              <a:rPr lang="en-US" dirty="0" err="1"/>
+              <a:t>en</a:t>
+            </a:r>
+            <a:r>
+              <a:rPr lang="en-US" dirty="0"/>
+              <a:t>/v2/Getting-Started-About-Version-Control</a:t>
+            </a:r>
+          </a:p>
+        </p:txBody>
+      </p:sp>
+    </p:spTree>
+    <p:extLst>
+      <p:ext uri="{BB962C8B-B14F-4D97-AF65-F5344CB8AC3E}">
+        <p14:creationId xmlns:p14="http://schemas.microsoft.com/office/powerpoint/2010/main" val="3254239750"/>
+      </p:ext>
+    </p:extLst>
+  </p:cSld>
+  <p:clrMapOvr>
+    <a:masterClrMapping/>
+  </p:clrMapOvr>
+</p:sld>
+</file>
+
+<file path=ppt/slides/slide7.xml><?xml version="1.0" encoding="utf-8"?>
+<p:sld xmlns:a="http://schemas.openxmlformats.org/drawingml/2006/main" xmlns:r="http://schemas.openxmlformats.org/officeDocument/2006/relationships" xmlns:p="http://schemas.openxmlformats.org/presentationml/2006/main">
+  <p:cSld>
+    <p:spTree>
+      <p:nvGrpSpPr>
+        <p:cNvPr id="1" name=""/>
+        <p:cNvGrpSpPr/>
+        <p:nvPr/>
+      </p:nvGrpSpPr>
+      <p:grpSpPr>
+        <a:xfrm>
+          <a:off x="0" y="0"/>
+          <a:ext cx="0" cy="0"/>
+          <a:chOff x="0" y="0"/>
+          <a:chExt cx="0" cy="0"/>
+        </a:xfrm>
+      </p:grpSpPr>
+      <p:sp>
+        <p:nvSpPr>
+          <p:cNvPr id="2" name="Title 1">
+            <a:extLst>
+              <a:ext uri="{FF2B5EF4-FFF2-40B4-BE49-F238E27FC236}">
+                <a16:creationId xmlns:a16="http://schemas.microsoft.com/office/drawing/2014/main" id="{C06D2B4C-CF86-6C4B-837A-DEA1C52D6AF9}"/>
+              </a:ext>
+            </a:extLst>
+          </p:cNvPr>
+          <p:cNvSpPr>
+            <a:spLocks noGrp="1"/>
+          </p:cNvSpPr>
+          <p:nvPr>
+            <p:ph type="title"/>
+          </p:nvPr>
+        </p:nvSpPr>
+        <p:spPr/>
+        <p:txBody>
+          <a:bodyPr/>
+          <a:lstStyle/>
+          <a:p>
+            <a:r>
+              <a:rPr lang="en-US" dirty="0"/>
+              <a:t>Out of Scope</a:t>
+            </a:r>
+          </a:p>
+        </p:txBody>
+      </p:sp>
+      <p:sp>
+        <p:nvSpPr>
+          <p:cNvPr id="3" name="Content Placeholder 2">
+            <a:extLst>
+              <a:ext uri="{FF2B5EF4-FFF2-40B4-BE49-F238E27FC236}">
+                <a16:creationId xmlns:a16="http://schemas.microsoft.com/office/drawing/2014/main" id="{3C315EFA-4AD2-DF42-AFA3-455810D7DEA2}"/>
+              </a:ext>
+            </a:extLst>
+          </p:cNvPr>
+          <p:cNvSpPr>
+            <a:spLocks noGrp="1"/>
+          </p:cNvSpPr>
+          <p:nvPr>
+            <p:ph idx="1"/>
+          </p:nvPr>
+        </p:nvSpPr>
+        <p:spPr/>
+        <p:txBody>
+          <a:bodyPr/>
+          <a:lstStyle/>
+          <a:p>
+            <a:r>
+              <a:rPr lang="en-US" dirty="0"/>
+              <a:t>Hosting services (</a:t>
+            </a:r>
+            <a:r>
+              <a:rPr lang="en-US" dirty="0" err="1"/>
+              <a:t>SourceForge</a:t>
+            </a:r>
+            <a:r>
+              <a:rPr lang="en-US" dirty="0"/>
+              <a:t>, GitHub, Bitbucket, etc.)</a:t>
+            </a:r>
+          </a:p>
+          <a:p>
+            <a:r>
+              <a:rPr lang="en-US" dirty="0"/>
+              <a:t>Integrated version control</a:t>
+            </a:r>
+          </a:p>
+          <a:p>
+            <a:r>
+              <a:rPr lang="en-US" dirty="0"/>
+              <a:t>Wikis</a:t>
+            </a:r>
+          </a:p>
+        </p:txBody>
+      </p:sp>
+    </p:spTree>
+    <p:extLst>
+      <p:ext uri="{BB962C8B-B14F-4D97-AF65-F5344CB8AC3E}">
+        <p14:creationId xmlns:p14="http://schemas.microsoft.com/office/powerpoint/2010/main" val="1091092911"/>
       </p:ext>
     </p:extLst>
   </p:cSld>
@@ -3677,4 +5954,299 @@
     </a:ext>
   </a:extLst>
 </a:theme>
+</file>
+
+<file path=ppt/theme/theme2.xml><?xml version="1.0" encoding="utf-8"?>
+<a:theme xmlns:a="http://schemas.openxmlformats.org/drawingml/2006/main" name="Office Theme">
+  <a:themeElements>
+    <a:clrScheme name="Office">
+      <a:dk1>
+        <a:sysClr val="windowText" lastClr="000000"/>
+      </a:dk1>
+      <a:lt1>
+        <a:sysClr val="window" lastClr="FFFFFF"/>
+      </a:lt1>
+      <a:dk2>
+        <a:srgbClr val="44546A"/>
+      </a:dk2>
+      <a:lt2>
+        <a:srgbClr val="E7E6E6"/>
+      </a:lt2>
+      <a:accent1>
+        <a:srgbClr val="4472C4"/>
+      </a:accent1>
+      <a:accent2>
+        <a:srgbClr val="ED7D31"/>
+      </a:accent2>
+      <a:accent3>
+        <a:srgbClr val="A5A5A5"/>
+      </a:accent3>
+      <a:accent4>
+        <a:srgbClr val="FFC000"/>
+      </a:accent4>
+      <a:accent5>
+        <a:srgbClr val="5B9BD5"/>
+      </a:accent5>
+      <a:accent6>
+        <a:srgbClr val="70AD47"/>
+      </a:accent6>
+      <a:hlink>
+        <a:srgbClr val="0563C1"/>
+      </a:hlink>
+      <a:folHlink>
+        <a:srgbClr val="954F72"/>
+      </a:folHlink>
+    </a:clrScheme>
+    <a:fontScheme name="Office">
+      <a:majorFont>
+        <a:latin typeface="Calibri Light" panose="020F0302020204030204"/>
+        <a:ea typeface=""/>
+        <a:cs typeface=""/>
+        <a:font script="Jpan" typeface="游ゴシック Light"/>
+        <a:font script="Hang" typeface="맑은 고딕"/>
+        <a:font script="Hans" typeface="等线 Light"/>
+        <a:font script="Hant" typeface="新細明體"/>
+        <a:font script="Arab" typeface="Times New Roman"/>
+        <a:font script="Hebr" typeface="Times New Roman"/>
+        <a:font script="Thai" typeface="Angsana New"/>
+        <a:font script="Ethi" typeface="Nyala"/>
+        <a:font script="Beng" typeface="Vrinda"/>
+        <a:font script="Gujr" typeface="Shruti"/>
+        <a:font script="Khmr" typeface="MoolBoran"/>
+        <a:font script="Knda" typeface="Tunga"/>
+        <a:font script="Guru" typeface="Raavi"/>
+        <a:font script="Cans" typeface="Euphemia"/>
+        <a:font script="Cher" typeface="Plantagenet Cherokee"/>
+        <a:font script="Yiii" typeface="Microsoft Yi Baiti"/>
+        <a:font script="Tibt" typeface="Microsoft Himalaya"/>
+        <a:font script="Thaa" typeface="MV Boli"/>
+        <a:font script="Deva" typeface="Mangal"/>
+        <a:font script="Telu" typeface="Gautami"/>
+        <a:font script="Taml" typeface="Latha"/>
+        <a:font script="Syrc" typeface="Estrangelo Edessa"/>
+        <a:font script="Orya" typeface="Kalinga"/>
+        <a:font script="Mlym" typeface="Kartika"/>
+        <a:font script="Laoo" typeface="DokChampa"/>
+        <a:font script="Sinh" typeface="Iskoola Pota"/>
+        <a:font script="Mong" typeface="Mongolian Baiti"/>
+        <a:font script="Viet" typeface="Times New Roman"/>
+        <a:font script="Uigh" typeface="Microsoft Uighur"/>
+        <a:font script="Geor" typeface="Sylfaen"/>
+        <a:font script="Armn" typeface="Arial"/>
+        <a:font script="Bugi" typeface="Leelawadee UI"/>
+        <a:font script="Bopo" typeface="Microsoft JhengHei"/>
+        <a:font script="Java" typeface="Javanese Text"/>
+        <a:font script="Lisu" typeface="Segoe UI"/>
+        <a:font script="Mymr" typeface="Myanmar Text"/>
+        <a:font script="Nkoo" typeface="Ebrima"/>
+        <a:font script="Olck" typeface="Nirmala UI"/>
+        <a:font script="Osma" typeface="Ebrima"/>
+        <a:font script="Phag" typeface="Phagspa"/>
+        <a:font script="Syrn" typeface="Estrangelo Edessa"/>
+        <a:font script="Syrj" typeface="Estrangelo Edessa"/>
+        <a:font script="Syre" typeface="Estrangelo Edessa"/>
+        <a:font script="Sora" typeface="Nirmala UI"/>
+        <a:font script="Tale" typeface="Microsoft Tai Le"/>
+        <a:font script="Talu" typeface="Microsoft New Tai Lue"/>
+        <a:font script="Tfng" typeface="Ebrima"/>
+      </a:majorFont>
+      <a:minorFont>
+        <a:latin typeface="Calibri" panose="020F0502020204030204"/>
+        <a:ea typeface=""/>
+        <a:cs typeface=""/>
+        <a:font script="Jpan" typeface="游ゴシック"/>
+        <a:font script="Hang" typeface="맑은 고딕"/>
+        <a:font script="Hans" typeface="等线"/>
+        <a:font script="Hant" typeface="新細明體"/>
+        <a:font script="Arab" typeface="Arial"/>
+        <a:font script="Hebr" typeface="Arial"/>
+        <a:font script="Thai" typeface="Cordia New"/>
+        <a:font script="Ethi" typeface="Nyala"/>
+        <a:font script="Beng" typeface="Vrinda"/>
+        <a:font script="Gujr" typeface="Shruti"/>
+        <a:font script="Khmr" typeface="DaunPenh"/>
+        <a:font script="Knda" typeface="Tunga"/>
+        <a:font script="Guru" typeface="Raavi"/>
+        <a:font script="Cans" typeface="Euphemia"/>
+        <a:font script="Cher" typeface="Plantagenet Cherokee"/>
+        <a:font script="Yiii" typeface="Microsoft Yi Baiti"/>
+        <a:font script="Tibt" typeface="Microsoft Himalaya"/>
+        <a:font script="Thaa" typeface="MV Boli"/>
+        <a:font script="Deva" typeface="Mangal"/>
+        <a:font script="Telu" typeface="Gautami"/>
+        <a:font script="Taml" typeface="Latha"/>
+        <a:font script="Syrc" typeface="Estrangelo Edessa"/>
+        <a:font script="Orya" typeface="Kalinga"/>
+        <a:font script="Mlym" typeface="Kartika"/>
+        <a:font script="Laoo" typeface="DokChampa"/>
+        <a:font script="Sinh" typeface="Iskoola Pota"/>
+        <a:font script="Mong" typeface="Mongolian Baiti"/>
+        <a:font script="Viet" typeface="Arial"/>
+        <a:font script="Uigh" typeface="Microsoft Uighur"/>
+        <a:font script="Geor" typeface="Sylfaen"/>
+        <a:font script="Armn" typeface="Arial"/>
+        <a:font script="Bugi" typeface="Leelawadee UI"/>
+        <a:font script="Bopo" typeface="Microsoft JhengHei"/>
+        <a:font script="Java" typeface="Javanese Text"/>
+        <a:font script="Lisu" typeface="Segoe UI"/>
+        <a:font script="Mymr" typeface="Myanmar Text"/>
+        <a:font script="Nkoo" typeface="Ebrima"/>
+        <a:font script="Olck" typeface="Nirmala UI"/>
+        <a:font script="Osma" typeface="Ebrima"/>
+        <a:font script="Phag" typeface="Phagspa"/>
+        <a:font script="Syrn" typeface="Estrangelo Edessa"/>
+        <a:font script="Syrj" typeface="Estrangelo Edessa"/>
+        <a:font script="Syre" typeface="Estrangelo Edessa"/>
+        <a:font script="Sora" typeface="Nirmala UI"/>
+        <a:font script="Tale" typeface="Microsoft Tai Le"/>
+        <a:font script="Talu" typeface="Microsoft New Tai Lue"/>
+        <a:font script="Tfng" typeface="Ebrima"/>
+      </a:minorFont>
+    </a:fontScheme>
+    <a:fmtScheme name="Office">
+      <a:fillStyleLst>
+        <a:solidFill>
+          <a:schemeClr val="phClr"/>
+        </a:solidFill>
+        <a:gradFill rotWithShape="1">
+          <a:gsLst>
+            <a:gs pos="0">
+              <a:schemeClr val="phClr">
+                <a:lumMod val="110000"/>
+                <a:satMod val="105000"/>
+                <a:tint val="67000"/>
+              </a:schemeClr>
+            </a:gs>
+            <a:gs pos="50000">
+              <a:schemeClr val="phClr">
+                <a:lumMod val="105000"/>
+                <a:satMod val="103000"/>
+                <a:tint val="73000"/>
+              </a:schemeClr>
+            </a:gs>
+            <a:gs pos="100000">
+              <a:schemeClr val="phClr">
+                <a:lumMod val="105000"/>
+                <a:satMod val="109000"/>
+                <a:tint val="81000"/>
+              </a:schemeClr>
+            </a:gs>
+          </a:gsLst>
+          <a:lin ang="5400000" scaled="0"/>
+        </a:gradFill>
+        <a:gradFill rotWithShape="1">
+          <a:gsLst>
+            <a:gs pos="0">
+              <a:schemeClr val="phClr">
+                <a:satMod val="103000"/>
+                <a:lumMod val="102000"/>
+                <a:tint val="94000"/>
+              </a:schemeClr>
+            </a:gs>
+            <a:gs pos="50000">
+              <a:schemeClr val="phClr">
+                <a:satMod val="110000"/>
+                <a:lumMod val="100000"/>
+                <a:shade val="100000"/>
+              </a:schemeClr>
+            </a:gs>
+            <a:gs pos="100000">
+              <a:schemeClr val="phClr">
+                <a:lumMod val="99000"/>
+                <a:satMod val="120000"/>
+                <a:shade val="78000"/>
+              </a:schemeClr>
+            </a:gs>
+          </a:gsLst>
+          <a:lin ang="5400000" scaled="0"/>
+        </a:gradFill>
+      </a:fillStyleLst>
+      <a:lnStyleLst>
+        <a:ln w="6350" cap="flat" cmpd="sng" algn="ctr">
+          <a:solidFill>
+            <a:schemeClr val="phClr"/>
+          </a:solidFill>
+          <a:prstDash val="solid"/>
+          <a:miter lim="800000"/>
+        </a:ln>
+        <a:ln w="12700" cap="flat" cmpd="sng" algn="ctr">
+          <a:solidFill>
+            <a:schemeClr val="phClr"/>
+          </a:solidFill>
+          <a:prstDash val="solid"/>
+          <a:miter lim="800000"/>
+        </a:ln>
+        <a:ln w="19050" cap="flat" cmpd="sng" algn="ctr">
+          <a:solidFill>
+            <a:schemeClr val="phClr"/>
+          </a:solidFill>
+          <a:prstDash val="solid"/>
+          <a:miter lim="800000"/>
+        </a:ln>
+      </a:lnStyleLst>
+      <a:effectStyleLst>
+        <a:effectStyle>
+          <a:effectLst/>
+        </a:effectStyle>
+        <a:effectStyle>
+          <a:effectLst/>
+        </a:effectStyle>
+        <a:effectStyle>
+          <a:effectLst>
+            <a:outerShdw blurRad="57150" dist="19050" dir="5400000" algn="ctr" rotWithShape="0">
+              <a:srgbClr val="000000">
+                <a:alpha val="63000"/>
+              </a:srgbClr>
+            </a:outerShdw>
+          </a:effectLst>
+        </a:effectStyle>
+      </a:effectStyleLst>
+      <a:bgFillStyleLst>
+        <a:solidFill>
+          <a:schemeClr val="phClr"/>
+        </a:solidFill>
+        <a:solidFill>
+          <a:schemeClr val="phClr">
+            <a:tint val="95000"/>
+            <a:satMod val="170000"/>
+          </a:schemeClr>
+        </a:solidFill>
+        <a:gradFill rotWithShape="1">
+          <a:gsLst>
+            <a:gs pos="0">
+              <a:schemeClr val="phClr">
+                <a:tint val="93000"/>
+                <a:satMod val="150000"/>
+                <a:shade val="98000"/>
+                <a:lumMod val="102000"/>
+              </a:schemeClr>
+            </a:gs>
+            <a:gs pos="50000">
+              <a:schemeClr val="phClr">
+                <a:tint val="98000"/>
+                <a:satMod val="130000"/>
+                <a:shade val="90000"/>
+                <a:lumMod val="103000"/>
+              </a:schemeClr>
+            </a:gs>
+            <a:gs pos="100000">
+              <a:schemeClr val="phClr">
+                <a:shade val="63000"/>
+                <a:satMod val="120000"/>
+              </a:schemeClr>
+            </a:gs>
+          </a:gsLst>
+          <a:lin ang="5400000" scaled="0"/>
+        </a:gradFill>
+      </a:bgFillStyleLst>
+    </a:fmtScheme>
+  </a:themeElements>
+  <a:objectDefaults/>
+  <a:extraClrSchemeLst/>
+  <a:extLst>
+    <a:ext uri="{05A4C25C-085E-4340-85A3-A5531E510DB2}">
+      <thm15:themeFamily xmlns:thm15="http://schemas.microsoft.com/office/thememl/2012/main" name="Office Theme" id="{62F939B6-93AF-4DB8-9C6B-D6C7DFDC589F}" vid="{4A3C46E8-61CC-4603-A589-7422A47A8E4A}"/>
+    </a:ext>
+  </a:extLst>
+</a:theme>
 </file>
</xml_diff>